<commit_message>
Make sure we do not handle some more binary files as text-files
</commit_message>
<xml_diff>
--- a/poitest/src/main/res/raw/sample.pptx
+++ b/poitest/src/main/res/raw/sample.pptx
@@ -1,3 +1,145 @@
+
+<file path=ppt/presentation.xml><?xml version="1.0" encoding="utf-8"?>
+<p:presentation xmlns:a="http://schemas.openxmlformats.org/drawingml/2006/main" xmlns:r="http://schemas.openxmlformats.org/officeDocument/2006/relationships" xmlns:p="http://schemas.openxmlformats.org/presentationml/2006/main" removePersonalInfoOnSave="1" saveSubsetFonts="1">
+  <p:sldMasterIdLst>
+    <p:sldMasterId id="2147483648" r:id="rId1"/>
+  </p:sldMasterIdLst>
+  <p:notesMasterIdLst>
+    <p:notesMasterId r:id="rId4"/>
+  </p:notesMasterIdLst>
+  <p:sldIdLst>
+    <p:sldId id="256" r:id="rId2"/>
+    <p:sldId id="257" r:id="rId3"/>
+  </p:sldIdLst>
+  <p:sldSz cx="9144000" cy="6858000" type="screen4x3"/>
+  <p:notesSz cx="6858000" cy="9144000"/>
+  <p:defaultTextStyle>
+    <a:defPPr>
+      <a:defRPr lang="en-US"/>
+    </a:defPPr>
+    <a:lvl1pPr algn="l" rtl="0" fontAlgn="base">
+      <a:spcBef>
+        <a:spcPct val="0"/>
+      </a:spcBef>
+      <a:spcAft>
+        <a:spcPct val="0"/>
+      </a:spcAft>
+      <a:defRPr kern="1200">
+        <a:solidFill>
+          <a:schemeClr val="tx1"/>
+        </a:solidFill>
+        <a:latin typeface="Arial" charset="0"/>
+        <a:ea typeface="+mn-ea"/>
+        <a:cs typeface="+mn-cs"/>
+      </a:defRPr>
+    </a:lvl1pPr>
+    <a:lvl2pPr marL="457200" algn="l" rtl="0" fontAlgn="base">
+      <a:spcBef>
+        <a:spcPct val="0"/>
+      </a:spcBef>
+      <a:spcAft>
+        <a:spcPct val="0"/>
+      </a:spcAft>
+      <a:defRPr kern="1200">
+        <a:solidFill>
+          <a:schemeClr val="tx1"/>
+        </a:solidFill>
+        <a:latin typeface="Arial" charset="0"/>
+        <a:ea typeface="+mn-ea"/>
+        <a:cs typeface="+mn-cs"/>
+      </a:defRPr>
+    </a:lvl2pPr>
+    <a:lvl3pPr marL="914400" algn="l" rtl="0" fontAlgn="base">
+      <a:spcBef>
+        <a:spcPct val="0"/>
+      </a:spcBef>
+      <a:spcAft>
+        <a:spcPct val="0"/>
+      </a:spcAft>
+      <a:defRPr kern="1200">
+        <a:solidFill>
+          <a:schemeClr val="tx1"/>
+        </a:solidFill>
+        <a:latin typeface="Arial" charset="0"/>
+        <a:ea typeface="+mn-ea"/>
+        <a:cs typeface="+mn-cs"/>
+      </a:defRPr>
+    </a:lvl3pPr>
+    <a:lvl4pPr marL="1371600" algn="l" rtl="0" fontAlgn="base">
+      <a:spcBef>
+        <a:spcPct val="0"/>
+      </a:spcBef>
+      <a:spcAft>
+        <a:spcPct val="0"/>
+      </a:spcAft>
+      <a:defRPr kern="1200">
+        <a:solidFill>
+          <a:schemeClr val="tx1"/>
+        </a:solidFill>
+        <a:latin typeface="Arial" charset="0"/>
+        <a:ea typeface="+mn-ea"/>
+        <a:cs typeface="+mn-cs"/>
+      </a:defRPr>
+    </a:lvl4pPr>
+    <a:lvl5pPr marL="1828800" algn="l" rtl="0" fontAlgn="base">
+      <a:spcBef>
+        <a:spcPct val="0"/>
+      </a:spcBef>
+      <a:spcAft>
+        <a:spcPct val="0"/>
+      </a:spcAft>
+      <a:defRPr kern="1200">
+        <a:solidFill>
+          <a:schemeClr val="tx1"/>
+        </a:solidFill>
+        <a:latin typeface="Arial" charset="0"/>
+        <a:ea typeface="+mn-ea"/>
+        <a:cs typeface="+mn-cs"/>
+      </a:defRPr>
+    </a:lvl5pPr>
+    <a:lvl6pPr marL="2286000" algn="l" defTabSz="914400" rtl="0" eaLnBrk="1" latinLnBrk="0" hangingPunct="1">
+      <a:defRPr kern="1200">
+        <a:solidFill>
+          <a:schemeClr val="tx1"/>
+        </a:solidFill>
+        <a:latin typeface="Arial" charset="0"/>
+        <a:ea typeface="+mn-ea"/>
+        <a:cs typeface="+mn-cs"/>
+      </a:defRPr>
+    </a:lvl6pPr>
+    <a:lvl7pPr marL="2743200" algn="l" defTabSz="914400" rtl="0" eaLnBrk="1" latinLnBrk="0" hangingPunct="1">
+      <a:defRPr kern="1200">
+        <a:solidFill>
+          <a:schemeClr val="tx1"/>
+        </a:solidFill>
+        <a:latin typeface="Arial" charset="0"/>
+        <a:ea typeface="+mn-ea"/>
+        <a:cs typeface="+mn-cs"/>
+      </a:defRPr>
+    </a:lvl7pPr>
+    <a:lvl8pPr marL="3200400" algn="l" defTabSz="914400" rtl="0" eaLnBrk="1" latinLnBrk="0" hangingPunct="1">
+      <a:defRPr kern="1200">
+        <a:solidFill>
+          <a:schemeClr val="tx1"/>
+        </a:solidFill>
+        <a:latin typeface="Arial" charset="0"/>
+        <a:ea typeface="+mn-ea"/>
+        <a:cs typeface="+mn-cs"/>
+      </a:defRPr>
+    </a:lvl8pPr>
+    <a:lvl9pPr marL="3657600" algn="l" defTabSz="914400" rtl="0" eaLnBrk="1" latinLnBrk="0" hangingPunct="1">
+      <a:defRPr kern="1200">
+        <a:solidFill>
+          <a:schemeClr val="tx1"/>
+        </a:solidFill>
+        <a:latin typeface="Arial" charset="0"/>
+        <a:ea typeface="+mn-ea"/>
+        <a:cs typeface="+mn-cs"/>
+      </a:defRPr>
+    </a:lvl9pPr>
+  </p:defaultTextStyle>
+</p:presentation>
+</file>
 
 <file path=ppt/notesMasters/notesMaster1.xml><?xml version="1.0" encoding="utf-8"?>
 <p:notesMaster xmlns:a="http://schemas.openxmlformats.org/drawingml/2006/main" xmlns:r="http://schemas.openxmlformats.org/officeDocument/2006/relationships" xmlns:p="http://schemas.openxmlformats.org/presentationml/2006/main">
@@ -344,6 +486,3262 @@
     </a:lvl9pPr>
   </p:notesStyle>
 </p:notesMaster>
+</file>
+
+<file path=ppt/notesSlides/notesSlide1.xml><?xml version="1.0" encoding="utf-8"?>
+<p:notes xmlns:a="http://schemas.openxmlformats.org/drawingml/2006/main" xmlns:r="http://schemas.openxmlformats.org/officeDocument/2006/relationships" xmlns:p="http://schemas.openxmlformats.org/presentationml/2006/main">
+  <p:cSld>
+    <p:spTree>
+      <p:nvGrpSpPr>
+        <p:cNvPr id="1" name=""/>
+        <p:cNvGrpSpPr/>
+        <p:nvPr/>
+      </p:nvGrpSpPr>
+      <p:grpSpPr>
+        <a:xfrm>
+          <a:off x="0" y="0"/>
+          <a:ext cx="0" cy="0"/>
+          <a:chOff x="0" y="0"/>
+          <a:chExt cx="0" cy="0"/>
+        </a:xfrm>
+      </p:grpSpPr>
+      <p:sp>
+        <p:nvSpPr>
+          <p:cNvPr id="2" name="Slide Image Placeholder 1"/>
+          <p:cNvSpPr>
+            <a:spLocks noGrp="1" noRot="1" noChangeAspect="1"/>
+          </p:cNvSpPr>
+          <p:nvPr>
+            <p:ph type="sldImg"/>
+          </p:nvPr>
+        </p:nvSpPr>
+        <p:spPr/>
+      </p:sp>
+      <p:sp>
+        <p:nvSpPr>
+          <p:cNvPr id="3" name="Notes Placeholder 2"/>
+          <p:cNvSpPr>
+            <a:spLocks noGrp="1"/>
+          </p:cNvSpPr>
+          <p:nvPr>
+            <p:ph type="body" idx="1"/>
+          </p:nvPr>
+        </p:nvSpPr>
+        <p:spPr/>
+        <p:txBody>
+          <a:bodyPr>
+            <a:normAutofit/>
+          </a:bodyPr>
+          <a:lstStyle/>
+          <a:p>
+            <a:endParaRPr lang="en-US"/>
+          </a:p>
+        </p:txBody>
+      </p:sp>
+      <p:sp>
+        <p:nvSpPr>
+          <p:cNvPr id="4" name="Slide Number Placeholder 3"/>
+          <p:cNvSpPr>
+            <a:spLocks noGrp="1"/>
+          </p:cNvSpPr>
+          <p:nvPr>
+            <p:ph type="sldNum" sz="quarter" idx="10"/>
+          </p:nvPr>
+        </p:nvSpPr>
+        <p:spPr/>
+        <p:txBody>
+          <a:bodyPr/>
+          <a:lstStyle/>
+          <a:p>
+            <a:fld id="{975BB87B-4768-4521-991C-A3C89D1764D9}" type="slidenum">
+              <a:rPr lang="en-US" smtClean="0"/>
+              <a:t>1</a:t>
+            </a:fld>
+            <a:endParaRPr lang="en-US"/>
+          </a:p>
+        </p:txBody>
+      </p:sp>
+    </p:spTree>
+  </p:cSld>
+  <p:clrMapOvr>
+    <a:masterClrMapping/>
+  </p:clrMapOvr>
+</p:notes>
+</file>
+
+<file path=ppt/notesSlides/notesSlide2.xml><?xml version="1.0" encoding="utf-8"?>
+<p:notes xmlns:a="http://schemas.openxmlformats.org/drawingml/2006/main" xmlns:r="http://schemas.openxmlformats.org/officeDocument/2006/relationships" xmlns:p="http://schemas.openxmlformats.org/presentationml/2006/main">
+  <p:cSld>
+    <p:spTree>
+      <p:nvGrpSpPr>
+        <p:cNvPr id="1" name=""/>
+        <p:cNvGrpSpPr/>
+        <p:nvPr/>
+      </p:nvGrpSpPr>
+      <p:grpSpPr>
+        <a:xfrm>
+          <a:off x="0" y="0"/>
+          <a:ext cx="0" cy="0"/>
+          <a:chOff x="0" y="0"/>
+          <a:chExt cx="0" cy="0"/>
+        </a:xfrm>
+      </p:grpSpPr>
+      <p:sp>
+        <p:nvSpPr>
+          <p:cNvPr id="2" name="Slide Image Placeholder 1"/>
+          <p:cNvSpPr>
+            <a:spLocks noGrp="1" noRot="1" noChangeAspect="1"/>
+          </p:cNvSpPr>
+          <p:nvPr>
+            <p:ph type="sldImg"/>
+          </p:nvPr>
+        </p:nvSpPr>
+        <p:spPr/>
+      </p:sp>
+      <p:sp>
+        <p:nvSpPr>
+          <p:cNvPr id="3" name="Notes Placeholder 2"/>
+          <p:cNvSpPr>
+            <a:spLocks noGrp="1"/>
+          </p:cNvSpPr>
+          <p:nvPr>
+            <p:ph type="body" idx="1"/>
+          </p:nvPr>
+        </p:nvSpPr>
+        <p:spPr/>
+        <p:txBody>
+          <a:bodyPr>
+            <a:normAutofit/>
+          </a:bodyPr>
+          <a:lstStyle/>
+          <a:p>
+            <a:endParaRPr lang="en-US"/>
+          </a:p>
+        </p:txBody>
+      </p:sp>
+      <p:sp>
+        <p:nvSpPr>
+          <p:cNvPr id="4" name="Slide Number Placeholder 3"/>
+          <p:cNvSpPr>
+            <a:spLocks noGrp="1"/>
+          </p:cNvSpPr>
+          <p:nvPr>
+            <p:ph type="sldNum" sz="quarter" idx="10"/>
+          </p:nvPr>
+        </p:nvSpPr>
+        <p:spPr/>
+        <p:txBody>
+          <a:bodyPr/>
+          <a:lstStyle/>
+          <a:p>
+            <a:fld id="{975BB87B-4768-4521-991C-A3C89D1764D9}" type="slidenum">
+              <a:rPr lang="en-US" smtClean="0"/>
+              <a:t>2</a:t>
+            </a:fld>
+            <a:endParaRPr lang="en-US"/>
+          </a:p>
+        </p:txBody>
+      </p:sp>
+    </p:spTree>
+  </p:cSld>
+  <p:clrMapOvr>
+    <a:masterClrMapping/>
+  </p:clrMapOvr>
+</p:notes>
+</file>
+
+<file path=ppt/slideLayouts/slideLayout1.xml><?xml version="1.0" encoding="utf-8"?>
+<p:sldLayout xmlns:a="http://schemas.openxmlformats.org/drawingml/2006/main" xmlns:r="http://schemas.openxmlformats.org/officeDocument/2006/relationships" xmlns:p="http://schemas.openxmlformats.org/presentationml/2006/main" type="title" preserve="1">
+  <p:cSld name="Title Slide">
+    <p:spTree>
+      <p:nvGrpSpPr>
+        <p:cNvPr id="1" name=""/>
+        <p:cNvGrpSpPr/>
+        <p:nvPr/>
+      </p:nvGrpSpPr>
+      <p:grpSpPr>
+        <a:xfrm>
+          <a:off x="0" y="0"/>
+          <a:ext cx="0" cy="0"/>
+          <a:chOff x="0" y="0"/>
+          <a:chExt cx="0" cy="0"/>
+        </a:xfrm>
+      </p:grpSpPr>
+      <p:sp>
+        <p:nvSpPr>
+          <p:cNvPr id="16" name="Rectangle 2"/>
+          <p:cNvSpPr>
+            <a:spLocks noGrp="1"/>
+          </p:cNvSpPr>
+          <p:nvPr>
+            <p:ph type="ctrTitle"/>
+          </p:nvPr>
+        </p:nvSpPr>
+        <p:spPr>
+          <a:xfrm>
+            <a:off x="685800" y="2130425"/>
+            <a:ext cx="7772400" cy="1470025"/>
+          </a:xfrm>
+        </p:spPr>
+        <p:txBody>
+          <a:bodyPr/>
+          <a:lstStyle/>
+          <a:p>
+            <a:r>
+              <a:rPr lang="en-US" smtClean="0"/>
+              <a:t>Click to edit Master title style</a:t>
+            </a:r>
+            <a:endParaRPr lang="en-US"/>
+          </a:p>
+        </p:txBody>
+      </p:sp>
+      <p:sp>
+        <p:nvSpPr>
+          <p:cNvPr id="25" name="Rectangle 3"/>
+          <p:cNvSpPr>
+            <a:spLocks noGrp="1"/>
+          </p:cNvSpPr>
+          <p:nvPr>
+            <p:ph type="subTitle" idx="1"/>
+          </p:nvPr>
+        </p:nvSpPr>
+        <p:spPr>
+          <a:xfrm>
+            <a:off x="1371600" y="3886200"/>
+            <a:ext cx="6400800" cy="1752600"/>
+          </a:xfrm>
+        </p:spPr>
+        <p:txBody>
+          <a:bodyPr/>
+          <a:lstStyle>
+            <a:lvl1pPr marL="0" indent="0" algn="ctr">
+              <a:buNone/>
+            </a:lvl1pPr>
+            <a:lvl2pPr marL="457200" indent="0" algn="ctr">
+              <a:buNone/>
+            </a:lvl2pPr>
+            <a:lvl3pPr marL="914400" indent="0" algn="ctr">
+              <a:buNone/>
+            </a:lvl3pPr>
+            <a:lvl4pPr marL="1371600" indent="0" algn="ctr">
+              <a:buNone/>
+            </a:lvl4pPr>
+            <a:lvl5pPr marL="1828800" indent="0" algn="ctr">
+              <a:buNone/>
+            </a:lvl5pPr>
+            <a:lvl6pPr marL="2286000" indent="0" algn="ctr">
+              <a:buNone/>
+            </a:lvl6pPr>
+            <a:lvl7pPr marL="2743200" indent="0" algn="ctr">
+              <a:buNone/>
+            </a:lvl7pPr>
+            <a:lvl8pPr marL="3200400" indent="0" algn="ctr">
+              <a:buNone/>
+            </a:lvl8pPr>
+            <a:lvl9pPr marL="3657600" indent="0" algn="ctr">
+              <a:buNone/>
+            </a:lvl9pPr>
+          </a:lstStyle>
+          <a:p>
+            <a:r>
+              <a:rPr lang="en-US" smtClean="0"/>
+              <a:t>Click to edit Master subtitle style</a:t>
+            </a:r>
+            <a:endParaRPr lang="en-US"/>
+          </a:p>
+        </p:txBody>
+      </p:sp>
+      <p:sp>
+        <p:nvSpPr>
+          <p:cNvPr id="15" name="Rectangle 4"/>
+          <p:cNvSpPr>
+            <a:spLocks noGrp="1"/>
+          </p:cNvSpPr>
+          <p:nvPr>
+            <p:ph type="dt" sz="half" idx="10"/>
+          </p:nvPr>
+        </p:nvSpPr>
+        <p:spPr>
+          <a:xfrm>
+            <a:off x="457200" y="6245225"/>
+            <a:ext cx="2133600" cy="476250"/>
+          </a:xfrm>
+          <a:prstGeom prst="rect">
+            <a:avLst/>
+          </a:prstGeom>
+          <a:noFill/>
+          <a:ln/>
+          <a:effectLst/>
+        </p:spPr>
+        <p:txBody>
+          <a:bodyPr/>
+          <a:lstStyle>
+            <a:lvl1pPr eaLnBrk="1" fontAlgn="auto">
+              <a:spcBef>
+                <a:spcPts val="0"/>
+              </a:spcBef>
+              <a:spcAft>
+                <a:spcPts val="0"/>
+              </a:spcAft>
+              <a:defRPr kern="0">
+                <a:latin typeface="+mn-lt"/>
+              </a:defRPr>
+            </a:lvl1pPr>
+          </a:lstStyle>
+          <a:p>
+            <a:pPr>
+              <a:defRPr/>
+            </a:pPr>
+            <a:fld id="{8E4C7396-2819-4CD4-A770-B073660FAD0A}" type="datetimeFigureOut">
+              <a:rPr lang="en-US"/>
+              <a:pPr>
+                <a:defRPr/>
+              </a:pPr>
+              <a:t>8/14/2007</a:t>
+            </a:fld>
+            <a:endParaRPr lang="en-US"/>
+          </a:p>
+        </p:txBody>
+      </p:sp>
+      <p:sp>
+        <p:nvSpPr>
+          <p:cNvPr id="29" name="Rectangle 5"/>
+          <p:cNvSpPr>
+            <a:spLocks noGrp="1"/>
+          </p:cNvSpPr>
+          <p:nvPr>
+            <p:ph type="ftr" sz="quarter" idx="11"/>
+          </p:nvPr>
+        </p:nvSpPr>
+        <p:spPr>
+          <a:xfrm>
+            <a:off x="3124200" y="6245225"/>
+            <a:ext cx="2895600" cy="476250"/>
+          </a:xfrm>
+          <a:prstGeom prst="rect">
+            <a:avLst/>
+          </a:prstGeom>
+          <a:noFill/>
+          <a:ln/>
+          <a:effectLst/>
+        </p:spPr>
+        <p:txBody>
+          <a:bodyPr/>
+          <a:lstStyle>
+            <a:lvl1pPr eaLnBrk="1" fontAlgn="auto">
+              <a:spcBef>
+                <a:spcPts val="0"/>
+              </a:spcBef>
+              <a:spcAft>
+                <a:spcPts val="0"/>
+              </a:spcAft>
+              <a:defRPr kern="0">
+                <a:latin typeface="+mn-lt"/>
+              </a:defRPr>
+            </a:lvl1pPr>
+          </a:lstStyle>
+          <a:p>
+            <a:pPr>
+              <a:defRPr/>
+            </a:pPr>
+            <a:endParaRPr lang="en-US"/>
+          </a:p>
+        </p:txBody>
+      </p:sp>
+      <p:sp>
+        <p:nvSpPr>
+          <p:cNvPr id="24" name="Rectangle 6"/>
+          <p:cNvSpPr>
+            <a:spLocks noGrp="1"/>
+          </p:cNvSpPr>
+          <p:nvPr>
+            <p:ph type="sldNum" sz="quarter" idx="12"/>
+          </p:nvPr>
+        </p:nvSpPr>
+        <p:spPr>
+          <a:xfrm>
+            <a:off x="6553200" y="6245225"/>
+            <a:ext cx="2133600" cy="476250"/>
+          </a:xfrm>
+          <a:prstGeom prst="rect">
+            <a:avLst/>
+          </a:prstGeom>
+          <a:noFill/>
+          <a:ln/>
+          <a:effectLst/>
+        </p:spPr>
+        <p:txBody>
+          <a:bodyPr/>
+          <a:lstStyle>
+            <a:lvl1pPr eaLnBrk="1" fontAlgn="auto">
+              <a:spcBef>
+                <a:spcPts val="0"/>
+              </a:spcBef>
+              <a:spcAft>
+                <a:spcPts val="0"/>
+              </a:spcAft>
+              <a:defRPr kern="0">
+                <a:latin typeface="+mn-lt"/>
+              </a:defRPr>
+            </a:lvl1pPr>
+          </a:lstStyle>
+          <a:p>
+            <a:pPr>
+              <a:defRPr/>
+            </a:pPr>
+            <a:fld id="{3B4D0F41-D1C5-4A25-8660-AA0785337E70}" type="slidenum">
+              <a:rPr lang="en-US"/>
+              <a:pPr>
+                <a:defRPr/>
+              </a:pPr>
+              <a:t>‹#›</a:t>
+            </a:fld>
+            <a:endParaRPr lang="en-US"/>
+          </a:p>
+        </p:txBody>
+      </p:sp>
+      <p:sp>
+        <p:nvSpPr>
+          <p:cNvPr id="7" name="Rectangle 4"/>
+          <p:cNvSpPr>
+            <a:spLocks noGrp="1"/>
+          </p:cNvSpPr>
+          <p:nvPr>
+            <p:ph type="dt" sz="half" idx="13"/>
+          </p:nvPr>
+        </p:nvSpPr>
+        <p:spPr>
+          <a:ln/>
+        </p:spPr>
+        <p:txBody>
+          <a:bodyPr/>
+          <a:lstStyle>
+            <a:lvl1pPr>
+              <a:defRPr/>
+            </a:lvl1pPr>
+          </a:lstStyle>
+          <a:p>
+            <a:fld id="{FCFDADFA-EB9D-4010-884E-0ED9201A937C}" type="datetime1">
+              <a:rPr lang="en-US"/>
+              <a:pPr/>
+              <a:t>8/14/2007</a:t>
+            </a:fld>
+            <a:endParaRPr lang="en-US"/>
+          </a:p>
+        </p:txBody>
+      </p:sp>
+      <p:sp>
+        <p:nvSpPr>
+          <p:cNvPr id="8" name="Rectangle 5"/>
+          <p:cNvSpPr>
+            <a:spLocks noGrp="1"/>
+          </p:cNvSpPr>
+          <p:nvPr>
+            <p:ph type="ftr" sz="quarter" idx="14"/>
+          </p:nvPr>
+        </p:nvSpPr>
+        <p:spPr>
+          <a:ln/>
+        </p:spPr>
+        <p:txBody>
+          <a:bodyPr/>
+          <a:lstStyle>
+            <a:lvl1pPr>
+              <a:defRPr/>
+            </a:lvl1pPr>
+          </a:lstStyle>
+          <a:p>
+            <a:endParaRPr lang="en-US"/>
+          </a:p>
+        </p:txBody>
+      </p:sp>
+      <p:sp>
+        <p:nvSpPr>
+          <p:cNvPr id="9" name="Rectangle 6"/>
+          <p:cNvSpPr>
+            <a:spLocks noGrp="1"/>
+          </p:cNvSpPr>
+          <p:nvPr>
+            <p:ph type="sldNum" sz="quarter" idx="15"/>
+          </p:nvPr>
+        </p:nvSpPr>
+        <p:spPr>
+          <a:ln/>
+        </p:spPr>
+        <p:txBody>
+          <a:bodyPr/>
+          <a:lstStyle>
+            <a:lvl1pPr>
+              <a:defRPr/>
+            </a:lvl1pPr>
+          </a:lstStyle>
+          <a:p>
+            <a:fld id="{52AE073D-4521-409C-8D84-0C71158ECE27}" type="slidenum">
+              <a:rPr lang="en-US"/>
+              <a:pPr/>
+              <a:t>‹#›</a:t>
+            </a:fld>
+            <a:endParaRPr lang="en-US"/>
+          </a:p>
+        </p:txBody>
+      </p:sp>
+    </p:spTree>
+  </p:cSld>
+  <p:clrMapOvr>
+    <a:masterClrMapping/>
+  </p:clrMapOvr>
+</p:sldLayout>
+</file>
+
+<file path=ppt/slideLayouts/slideLayout2.xml><?xml version="1.0" encoding="utf-8"?>
+<p:sldLayout xmlns:a="http://schemas.openxmlformats.org/drawingml/2006/main" xmlns:r="http://schemas.openxmlformats.org/officeDocument/2006/relationships" xmlns:p="http://schemas.openxmlformats.org/presentationml/2006/main" type="obj" preserve="1">
+  <p:cSld name="Title and Content">
+    <p:spTree>
+      <p:nvGrpSpPr>
+        <p:cNvPr id="1" name=""/>
+        <p:cNvGrpSpPr/>
+        <p:nvPr/>
+      </p:nvGrpSpPr>
+      <p:grpSpPr>
+        <a:xfrm>
+          <a:off x="0" y="0"/>
+          <a:ext cx="0" cy="0"/>
+          <a:chOff x="0" y="0"/>
+          <a:chExt cx="0" cy="0"/>
+        </a:xfrm>
+      </p:grpSpPr>
+      <p:sp>
+        <p:nvSpPr>
+          <p:cNvPr id="19" name="Rectangle 2"/>
+          <p:cNvSpPr>
+            <a:spLocks noGrp="1"/>
+          </p:cNvSpPr>
+          <p:nvPr>
+            <p:ph type="title"/>
+          </p:nvPr>
+        </p:nvSpPr>
+        <p:spPr/>
+        <p:txBody>
+          <a:bodyPr/>
+          <a:lstStyle/>
+          <a:p>
+            <a:r>
+              <a:rPr lang="en-US" smtClean="0"/>
+              <a:t>Click to edit Master title style</a:t>
+            </a:r>
+            <a:endParaRPr lang="en-US"/>
+          </a:p>
+        </p:txBody>
+      </p:sp>
+      <p:sp>
+        <p:nvSpPr>
+          <p:cNvPr id="10" name="Rectangle 3"/>
+          <p:cNvSpPr>
+            <a:spLocks noGrp="1"/>
+          </p:cNvSpPr>
+          <p:nvPr>
+            <p:ph idx="1"/>
+          </p:nvPr>
+        </p:nvSpPr>
+        <p:spPr/>
+        <p:txBody>
+          <a:bodyPr/>
+          <a:lstStyle/>
+          <a:p>
+            <a:pPr lvl="0"/>
+            <a:r>
+              <a:rPr lang="en-US" smtClean="0"/>
+              <a:t>Click to edit Master text styles</a:t>
+            </a:r>
+          </a:p>
+          <a:p>
+            <a:pPr lvl="1"/>
+            <a:r>
+              <a:rPr lang="en-US" smtClean="0"/>
+              <a:t>Second level</a:t>
+            </a:r>
+          </a:p>
+          <a:p>
+            <a:pPr lvl="2"/>
+            <a:r>
+              <a:rPr lang="en-US" smtClean="0"/>
+              <a:t>Third level</a:t>
+            </a:r>
+          </a:p>
+          <a:p>
+            <a:pPr lvl="3"/>
+            <a:r>
+              <a:rPr lang="en-US" smtClean="0"/>
+              <a:t>Fourth level</a:t>
+            </a:r>
+          </a:p>
+          <a:p>
+            <a:pPr lvl="4"/>
+            <a:r>
+              <a:rPr lang="en-US" smtClean="0"/>
+              <a:t>Fifth level</a:t>
+            </a:r>
+            <a:endParaRPr lang="en-US"/>
+          </a:p>
+        </p:txBody>
+      </p:sp>
+      <p:sp>
+        <p:nvSpPr>
+          <p:cNvPr id="16" name="Rectangle 4"/>
+          <p:cNvSpPr>
+            <a:spLocks noGrp="1"/>
+          </p:cNvSpPr>
+          <p:nvPr>
+            <p:ph type="dt" sz="half" idx="10"/>
+          </p:nvPr>
+        </p:nvSpPr>
+        <p:spPr>
+          <a:xfrm>
+            <a:off x="457200" y="6245225"/>
+            <a:ext cx="2133600" cy="476250"/>
+          </a:xfrm>
+          <a:prstGeom prst="rect">
+            <a:avLst/>
+          </a:prstGeom>
+          <a:noFill/>
+          <a:ln/>
+          <a:effectLst/>
+        </p:spPr>
+        <p:txBody>
+          <a:bodyPr/>
+          <a:lstStyle>
+            <a:lvl1pPr eaLnBrk="1" fontAlgn="auto">
+              <a:spcBef>
+                <a:spcPts val="0"/>
+              </a:spcBef>
+              <a:spcAft>
+                <a:spcPts val="0"/>
+              </a:spcAft>
+              <a:defRPr kern="0">
+                <a:latin typeface="+mn-lt"/>
+              </a:defRPr>
+            </a:lvl1pPr>
+          </a:lstStyle>
+          <a:p>
+            <a:pPr>
+              <a:defRPr/>
+            </a:pPr>
+            <a:fld id="{8E4C7396-2819-4CD4-A770-B073660FAD0A}" type="datetimeFigureOut">
+              <a:rPr lang="en-US"/>
+              <a:pPr>
+                <a:defRPr/>
+              </a:pPr>
+              <a:t>8/14/2007</a:t>
+            </a:fld>
+            <a:endParaRPr lang="en-US"/>
+          </a:p>
+        </p:txBody>
+      </p:sp>
+      <p:sp>
+        <p:nvSpPr>
+          <p:cNvPr id="5" name="Rectangle 5"/>
+          <p:cNvSpPr>
+            <a:spLocks noGrp="1"/>
+          </p:cNvSpPr>
+          <p:nvPr>
+            <p:ph type="ftr" sz="quarter" idx="11"/>
+          </p:nvPr>
+        </p:nvSpPr>
+        <p:spPr>
+          <a:xfrm>
+            <a:off x="3124200" y="6245225"/>
+            <a:ext cx="2895600" cy="476250"/>
+          </a:xfrm>
+          <a:prstGeom prst="rect">
+            <a:avLst/>
+          </a:prstGeom>
+          <a:noFill/>
+          <a:ln/>
+          <a:effectLst/>
+        </p:spPr>
+        <p:txBody>
+          <a:bodyPr/>
+          <a:lstStyle>
+            <a:lvl1pPr eaLnBrk="1" fontAlgn="auto">
+              <a:spcBef>
+                <a:spcPts val="0"/>
+              </a:spcBef>
+              <a:spcAft>
+                <a:spcPts val="0"/>
+              </a:spcAft>
+              <a:defRPr kern="0">
+                <a:latin typeface="+mn-lt"/>
+              </a:defRPr>
+            </a:lvl1pPr>
+          </a:lstStyle>
+          <a:p>
+            <a:pPr>
+              <a:defRPr/>
+            </a:pPr>
+            <a:endParaRPr lang="en-US"/>
+          </a:p>
+        </p:txBody>
+      </p:sp>
+      <p:sp>
+        <p:nvSpPr>
+          <p:cNvPr id="29" name="Rectangle 6"/>
+          <p:cNvSpPr>
+            <a:spLocks noGrp="1"/>
+          </p:cNvSpPr>
+          <p:nvPr>
+            <p:ph type="sldNum" sz="quarter" idx="12"/>
+          </p:nvPr>
+        </p:nvSpPr>
+        <p:spPr>
+          <a:xfrm>
+            <a:off x="6553200" y="6245225"/>
+            <a:ext cx="2133600" cy="476250"/>
+          </a:xfrm>
+          <a:prstGeom prst="rect">
+            <a:avLst/>
+          </a:prstGeom>
+          <a:noFill/>
+          <a:ln/>
+          <a:effectLst/>
+        </p:spPr>
+        <p:txBody>
+          <a:bodyPr/>
+          <a:lstStyle>
+            <a:lvl1pPr eaLnBrk="1" fontAlgn="auto">
+              <a:spcBef>
+                <a:spcPts val="0"/>
+              </a:spcBef>
+              <a:spcAft>
+                <a:spcPts val="0"/>
+              </a:spcAft>
+              <a:defRPr kern="0">
+                <a:latin typeface="+mn-lt"/>
+              </a:defRPr>
+            </a:lvl1pPr>
+          </a:lstStyle>
+          <a:p>
+            <a:pPr>
+              <a:defRPr/>
+            </a:pPr>
+            <a:fld id="{5FA7539F-09F7-47AD-9E45-105E9BA605B2}" type="slidenum">
+              <a:rPr lang="en-US"/>
+              <a:pPr>
+                <a:defRPr/>
+              </a:pPr>
+              <a:t>‹#›</a:t>
+            </a:fld>
+            <a:endParaRPr lang="en-US"/>
+          </a:p>
+        </p:txBody>
+      </p:sp>
+      <p:sp>
+        <p:nvSpPr>
+          <p:cNvPr id="7" name="Rectangle 4"/>
+          <p:cNvSpPr>
+            <a:spLocks noGrp="1"/>
+          </p:cNvSpPr>
+          <p:nvPr>
+            <p:ph type="dt" sz="half" idx="13"/>
+          </p:nvPr>
+        </p:nvSpPr>
+        <p:spPr>
+          <a:ln/>
+        </p:spPr>
+        <p:txBody>
+          <a:bodyPr/>
+          <a:lstStyle>
+            <a:lvl1pPr>
+              <a:defRPr/>
+            </a:lvl1pPr>
+          </a:lstStyle>
+          <a:p>
+            <a:fld id="{FCFDADFA-EB9D-4010-884E-0ED9201A937C}" type="datetime1">
+              <a:rPr lang="en-US"/>
+              <a:pPr/>
+              <a:t>8/14/2007</a:t>
+            </a:fld>
+            <a:endParaRPr lang="en-US"/>
+          </a:p>
+        </p:txBody>
+      </p:sp>
+      <p:sp>
+        <p:nvSpPr>
+          <p:cNvPr id="8" name="Rectangle 5"/>
+          <p:cNvSpPr>
+            <a:spLocks noGrp="1"/>
+          </p:cNvSpPr>
+          <p:nvPr>
+            <p:ph type="ftr" sz="quarter" idx="14"/>
+          </p:nvPr>
+        </p:nvSpPr>
+        <p:spPr>
+          <a:ln/>
+        </p:spPr>
+        <p:txBody>
+          <a:bodyPr/>
+          <a:lstStyle>
+            <a:lvl1pPr>
+              <a:defRPr/>
+            </a:lvl1pPr>
+          </a:lstStyle>
+          <a:p>
+            <a:endParaRPr lang="en-US"/>
+          </a:p>
+        </p:txBody>
+      </p:sp>
+      <p:sp>
+        <p:nvSpPr>
+          <p:cNvPr id="9" name="Rectangle 6"/>
+          <p:cNvSpPr>
+            <a:spLocks noGrp="1"/>
+          </p:cNvSpPr>
+          <p:nvPr>
+            <p:ph type="sldNum" sz="quarter" idx="15"/>
+          </p:nvPr>
+        </p:nvSpPr>
+        <p:spPr>
+          <a:ln/>
+        </p:spPr>
+        <p:txBody>
+          <a:bodyPr/>
+          <a:lstStyle>
+            <a:lvl1pPr>
+              <a:defRPr/>
+            </a:lvl1pPr>
+          </a:lstStyle>
+          <a:p>
+            <a:fld id="{FD2542E0-BC0C-4AF8-B34C-7B878494113F}" type="slidenum">
+              <a:rPr lang="en-US"/>
+              <a:pPr/>
+              <a:t>‹#›</a:t>
+            </a:fld>
+            <a:endParaRPr lang="en-US"/>
+          </a:p>
+        </p:txBody>
+      </p:sp>
+    </p:spTree>
+  </p:cSld>
+  <p:clrMapOvr>
+    <a:masterClrMapping/>
+  </p:clrMapOvr>
+</p:sldLayout>
+</file>
+
+<file path=ppt/slideLayouts/slideLayout3.xml><?xml version="1.0" encoding="utf-8"?>
+<p:sldLayout xmlns:a="http://schemas.openxmlformats.org/drawingml/2006/main" xmlns:r="http://schemas.openxmlformats.org/officeDocument/2006/relationships" xmlns:p="http://schemas.openxmlformats.org/presentationml/2006/main" type="titleOnly" preserve="1">
+  <p:cSld name="Title Only">
+    <p:spTree>
+      <p:nvGrpSpPr>
+        <p:cNvPr id="1" name=""/>
+        <p:cNvGrpSpPr/>
+        <p:nvPr/>
+      </p:nvGrpSpPr>
+      <p:grpSpPr>
+        <a:xfrm>
+          <a:off x="0" y="0"/>
+          <a:ext cx="0" cy="0"/>
+          <a:chOff x="0" y="0"/>
+          <a:chExt cx="0" cy="0"/>
+        </a:xfrm>
+      </p:grpSpPr>
+      <p:sp>
+        <p:nvSpPr>
+          <p:cNvPr id="10" name="Rectangle 2"/>
+          <p:cNvSpPr>
+            <a:spLocks noGrp="1"/>
+          </p:cNvSpPr>
+          <p:nvPr>
+            <p:ph type="title"/>
+          </p:nvPr>
+        </p:nvSpPr>
+        <p:spPr/>
+        <p:txBody>
+          <a:bodyPr/>
+          <a:lstStyle/>
+          <a:p>
+            <a:r>
+              <a:rPr lang="en-US" smtClean="0"/>
+              <a:t>Click to edit Master title style</a:t>
+            </a:r>
+            <a:endParaRPr lang="en-US"/>
+          </a:p>
+        </p:txBody>
+      </p:sp>
+      <p:sp>
+        <p:nvSpPr>
+          <p:cNvPr id="14" name="Rectangle 3"/>
+          <p:cNvSpPr>
+            <a:spLocks noGrp="1"/>
+          </p:cNvSpPr>
+          <p:nvPr>
+            <p:ph type="dt" sz="half" idx="10"/>
+          </p:nvPr>
+        </p:nvSpPr>
+        <p:spPr>
+          <a:xfrm>
+            <a:off x="457200" y="6245225"/>
+            <a:ext cx="2133600" cy="476250"/>
+          </a:xfrm>
+          <a:prstGeom prst="rect">
+            <a:avLst/>
+          </a:prstGeom>
+          <a:noFill/>
+          <a:ln/>
+          <a:effectLst/>
+        </p:spPr>
+        <p:txBody>
+          <a:bodyPr/>
+          <a:lstStyle>
+            <a:lvl1pPr eaLnBrk="1" fontAlgn="auto">
+              <a:spcBef>
+                <a:spcPts val="0"/>
+              </a:spcBef>
+              <a:spcAft>
+                <a:spcPts val="0"/>
+              </a:spcAft>
+              <a:defRPr kern="0">
+                <a:latin typeface="+mn-lt"/>
+              </a:defRPr>
+            </a:lvl1pPr>
+          </a:lstStyle>
+          <a:p>
+            <a:pPr>
+              <a:defRPr/>
+            </a:pPr>
+            <a:fld id="{8E4C7396-2819-4CD4-A770-B073660FAD0A}" type="datetimeFigureOut">
+              <a:rPr lang="en-US"/>
+              <a:pPr>
+                <a:defRPr/>
+              </a:pPr>
+              <a:t>8/14/2007</a:t>
+            </a:fld>
+            <a:endParaRPr lang="en-US"/>
+          </a:p>
+        </p:txBody>
+      </p:sp>
+      <p:sp>
+        <p:nvSpPr>
+          <p:cNvPr id="25" name="Rectangle 4"/>
+          <p:cNvSpPr>
+            <a:spLocks noGrp="1"/>
+          </p:cNvSpPr>
+          <p:nvPr>
+            <p:ph type="ftr" sz="quarter" idx="11"/>
+          </p:nvPr>
+        </p:nvSpPr>
+        <p:spPr>
+          <a:xfrm>
+            <a:off x="3124200" y="6245225"/>
+            <a:ext cx="2895600" cy="476250"/>
+          </a:xfrm>
+          <a:prstGeom prst="rect">
+            <a:avLst/>
+          </a:prstGeom>
+          <a:noFill/>
+          <a:ln/>
+          <a:effectLst/>
+        </p:spPr>
+        <p:txBody>
+          <a:bodyPr/>
+          <a:lstStyle>
+            <a:lvl1pPr eaLnBrk="1" fontAlgn="auto">
+              <a:spcBef>
+                <a:spcPts val="0"/>
+              </a:spcBef>
+              <a:spcAft>
+                <a:spcPts val="0"/>
+              </a:spcAft>
+              <a:defRPr kern="0">
+                <a:latin typeface="+mn-lt"/>
+              </a:defRPr>
+            </a:lvl1pPr>
+          </a:lstStyle>
+          <a:p>
+            <a:pPr>
+              <a:defRPr/>
+            </a:pPr>
+            <a:endParaRPr lang="en-US"/>
+          </a:p>
+        </p:txBody>
+      </p:sp>
+      <p:sp>
+        <p:nvSpPr>
+          <p:cNvPr id="15" name="Rectangle 5"/>
+          <p:cNvSpPr>
+            <a:spLocks noGrp="1"/>
+          </p:cNvSpPr>
+          <p:nvPr>
+            <p:ph type="sldNum" sz="quarter" idx="12"/>
+          </p:nvPr>
+        </p:nvSpPr>
+        <p:spPr>
+          <a:xfrm>
+            <a:off x="6553200" y="6245225"/>
+            <a:ext cx="2133600" cy="476250"/>
+          </a:xfrm>
+          <a:prstGeom prst="rect">
+            <a:avLst/>
+          </a:prstGeom>
+          <a:noFill/>
+          <a:ln/>
+          <a:effectLst/>
+        </p:spPr>
+        <p:txBody>
+          <a:bodyPr/>
+          <a:lstStyle>
+            <a:lvl1pPr eaLnBrk="1" fontAlgn="auto">
+              <a:spcBef>
+                <a:spcPts val="0"/>
+              </a:spcBef>
+              <a:spcAft>
+                <a:spcPts val="0"/>
+              </a:spcAft>
+              <a:defRPr kern="0">
+                <a:latin typeface="+mn-lt"/>
+              </a:defRPr>
+            </a:lvl1pPr>
+          </a:lstStyle>
+          <a:p>
+            <a:pPr>
+              <a:defRPr/>
+            </a:pPr>
+            <a:fld id="{C738CC58-ABD2-43E4-9B74-CD33CA1A0387}" type="slidenum">
+              <a:rPr lang="en-US"/>
+              <a:pPr>
+                <a:defRPr/>
+              </a:pPr>
+              <a:t>‹#›</a:t>
+            </a:fld>
+            <a:endParaRPr lang="en-US"/>
+          </a:p>
+        </p:txBody>
+      </p:sp>
+      <p:sp>
+        <p:nvSpPr>
+          <p:cNvPr id="6" name="Rectangle 4"/>
+          <p:cNvSpPr>
+            <a:spLocks noGrp="1"/>
+          </p:cNvSpPr>
+          <p:nvPr>
+            <p:ph type="dt" sz="half" idx="13"/>
+          </p:nvPr>
+        </p:nvSpPr>
+        <p:spPr>
+          <a:ln/>
+        </p:spPr>
+        <p:txBody>
+          <a:bodyPr/>
+          <a:lstStyle>
+            <a:lvl1pPr>
+              <a:defRPr/>
+            </a:lvl1pPr>
+          </a:lstStyle>
+          <a:p>
+            <a:fld id="{FCFDADFA-EB9D-4010-884E-0ED9201A937C}" type="datetime1">
+              <a:rPr lang="en-US"/>
+              <a:pPr/>
+              <a:t>8/14/2007</a:t>
+            </a:fld>
+            <a:endParaRPr lang="en-US"/>
+          </a:p>
+        </p:txBody>
+      </p:sp>
+      <p:sp>
+        <p:nvSpPr>
+          <p:cNvPr id="7" name="Rectangle 5"/>
+          <p:cNvSpPr>
+            <a:spLocks noGrp="1"/>
+          </p:cNvSpPr>
+          <p:nvPr>
+            <p:ph type="ftr" sz="quarter" idx="14"/>
+          </p:nvPr>
+        </p:nvSpPr>
+        <p:spPr>
+          <a:ln/>
+        </p:spPr>
+        <p:txBody>
+          <a:bodyPr/>
+          <a:lstStyle>
+            <a:lvl1pPr>
+              <a:defRPr/>
+            </a:lvl1pPr>
+          </a:lstStyle>
+          <a:p>
+            <a:endParaRPr lang="en-US"/>
+          </a:p>
+        </p:txBody>
+      </p:sp>
+      <p:sp>
+        <p:nvSpPr>
+          <p:cNvPr id="8" name="Rectangle 6"/>
+          <p:cNvSpPr>
+            <a:spLocks noGrp="1"/>
+          </p:cNvSpPr>
+          <p:nvPr>
+            <p:ph type="sldNum" sz="quarter" idx="15"/>
+          </p:nvPr>
+        </p:nvSpPr>
+        <p:spPr>
+          <a:ln/>
+        </p:spPr>
+        <p:txBody>
+          <a:bodyPr/>
+          <a:lstStyle>
+            <a:lvl1pPr>
+              <a:defRPr/>
+            </a:lvl1pPr>
+          </a:lstStyle>
+          <a:p>
+            <a:fld id="{065542C1-2346-48A4-8E1D-0697BB01988E}" type="slidenum">
+              <a:rPr lang="en-US"/>
+              <a:pPr/>
+              <a:t>‹#›</a:t>
+            </a:fld>
+            <a:endParaRPr lang="en-US"/>
+          </a:p>
+        </p:txBody>
+      </p:sp>
+    </p:spTree>
+  </p:cSld>
+  <p:clrMapOvr>
+    <a:masterClrMapping/>
+  </p:clrMapOvr>
+</p:sldLayout>
+</file>
+
+<file path=ppt/slideLayouts/slideLayout4.xml><?xml version="1.0" encoding="utf-8"?>
+<p:sldLayout xmlns:a="http://schemas.openxmlformats.org/drawingml/2006/main" xmlns:r="http://schemas.openxmlformats.org/officeDocument/2006/relationships" xmlns:p="http://schemas.openxmlformats.org/presentationml/2006/main" type="blank" preserve="1">
+  <p:cSld name="Blank">
+    <p:spTree>
+      <p:nvGrpSpPr>
+        <p:cNvPr id="1" name=""/>
+        <p:cNvGrpSpPr/>
+        <p:nvPr/>
+      </p:nvGrpSpPr>
+      <p:grpSpPr>
+        <a:xfrm>
+          <a:off x="0" y="0"/>
+          <a:ext cx="0" cy="0"/>
+          <a:chOff x="0" y="0"/>
+          <a:chExt cx="0" cy="0"/>
+        </a:xfrm>
+      </p:grpSpPr>
+      <p:sp>
+        <p:nvSpPr>
+          <p:cNvPr id="10" name="Rectangle 2"/>
+          <p:cNvSpPr>
+            <a:spLocks noGrp="1"/>
+          </p:cNvSpPr>
+          <p:nvPr>
+            <p:ph type="dt" sz="half" idx="10"/>
+          </p:nvPr>
+        </p:nvSpPr>
+        <p:spPr>
+          <a:xfrm>
+            <a:off x="457200" y="6245225"/>
+            <a:ext cx="2133600" cy="476250"/>
+          </a:xfrm>
+          <a:prstGeom prst="rect">
+            <a:avLst/>
+          </a:prstGeom>
+          <a:noFill/>
+          <a:ln/>
+          <a:effectLst/>
+        </p:spPr>
+        <p:txBody>
+          <a:bodyPr/>
+          <a:lstStyle>
+            <a:lvl1pPr eaLnBrk="1" fontAlgn="auto">
+              <a:spcBef>
+                <a:spcPts val="0"/>
+              </a:spcBef>
+              <a:spcAft>
+                <a:spcPts val="0"/>
+              </a:spcAft>
+              <a:defRPr kern="0">
+                <a:latin typeface="+mn-lt"/>
+              </a:defRPr>
+            </a:lvl1pPr>
+          </a:lstStyle>
+          <a:p>
+            <a:pPr>
+              <a:defRPr/>
+            </a:pPr>
+            <a:fld id="{8E4C7396-2819-4CD4-A770-B073660FAD0A}" type="datetimeFigureOut">
+              <a:rPr lang="en-US"/>
+              <a:pPr>
+                <a:defRPr/>
+              </a:pPr>
+              <a:t>8/14/2007</a:t>
+            </a:fld>
+            <a:endParaRPr lang="en-US"/>
+          </a:p>
+        </p:txBody>
+      </p:sp>
+      <p:sp>
+        <p:nvSpPr>
+          <p:cNvPr id="31" name="Rectangle 3"/>
+          <p:cNvSpPr>
+            <a:spLocks noGrp="1"/>
+          </p:cNvSpPr>
+          <p:nvPr>
+            <p:ph type="ftr" sz="quarter" idx="11"/>
+          </p:nvPr>
+        </p:nvSpPr>
+        <p:spPr>
+          <a:xfrm>
+            <a:off x="3124200" y="6245225"/>
+            <a:ext cx="2895600" cy="476250"/>
+          </a:xfrm>
+          <a:prstGeom prst="rect">
+            <a:avLst/>
+          </a:prstGeom>
+          <a:noFill/>
+          <a:ln/>
+          <a:effectLst/>
+        </p:spPr>
+        <p:txBody>
+          <a:bodyPr/>
+          <a:lstStyle>
+            <a:lvl1pPr eaLnBrk="1" fontAlgn="auto">
+              <a:spcBef>
+                <a:spcPts val="0"/>
+              </a:spcBef>
+              <a:spcAft>
+                <a:spcPts val="0"/>
+              </a:spcAft>
+              <a:defRPr kern="0">
+                <a:latin typeface="+mn-lt"/>
+              </a:defRPr>
+            </a:lvl1pPr>
+          </a:lstStyle>
+          <a:p>
+            <a:pPr>
+              <a:defRPr/>
+            </a:pPr>
+            <a:endParaRPr lang="en-US"/>
+          </a:p>
+        </p:txBody>
+      </p:sp>
+      <p:sp>
+        <p:nvSpPr>
+          <p:cNvPr id="22" name="Rectangle 4"/>
+          <p:cNvSpPr>
+            <a:spLocks noGrp="1"/>
+          </p:cNvSpPr>
+          <p:nvPr>
+            <p:ph type="sldNum" sz="quarter" idx="12"/>
+          </p:nvPr>
+        </p:nvSpPr>
+        <p:spPr>
+          <a:xfrm>
+            <a:off x="6553200" y="6245225"/>
+            <a:ext cx="2133600" cy="476250"/>
+          </a:xfrm>
+          <a:prstGeom prst="rect">
+            <a:avLst/>
+          </a:prstGeom>
+          <a:noFill/>
+          <a:ln/>
+          <a:effectLst/>
+        </p:spPr>
+        <p:txBody>
+          <a:bodyPr/>
+          <a:lstStyle>
+            <a:lvl1pPr eaLnBrk="1" fontAlgn="auto">
+              <a:spcBef>
+                <a:spcPts val="0"/>
+              </a:spcBef>
+              <a:spcAft>
+                <a:spcPts val="0"/>
+              </a:spcAft>
+              <a:defRPr kern="0">
+                <a:latin typeface="+mn-lt"/>
+              </a:defRPr>
+            </a:lvl1pPr>
+          </a:lstStyle>
+          <a:p>
+            <a:pPr>
+              <a:defRPr/>
+            </a:pPr>
+            <a:fld id="{33FF3C73-1782-4D24-98F9-D463D7C28007}" type="slidenum">
+              <a:rPr lang="en-US"/>
+              <a:pPr>
+                <a:defRPr/>
+              </a:pPr>
+              <a:t>‹#›</a:t>
+            </a:fld>
+            <a:endParaRPr lang="en-US"/>
+          </a:p>
+        </p:txBody>
+      </p:sp>
+      <p:sp>
+        <p:nvSpPr>
+          <p:cNvPr id="5" name="Rectangle 4"/>
+          <p:cNvSpPr>
+            <a:spLocks noGrp="1"/>
+          </p:cNvSpPr>
+          <p:nvPr>
+            <p:ph type="dt" sz="half" idx="13"/>
+          </p:nvPr>
+        </p:nvSpPr>
+        <p:spPr>
+          <a:ln/>
+        </p:spPr>
+        <p:txBody>
+          <a:bodyPr/>
+          <a:lstStyle>
+            <a:lvl1pPr>
+              <a:defRPr/>
+            </a:lvl1pPr>
+          </a:lstStyle>
+          <a:p>
+            <a:fld id="{FCFDADFA-EB9D-4010-884E-0ED9201A937C}" type="datetime1">
+              <a:rPr lang="en-US"/>
+              <a:pPr/>
+              <a:t>8/14/2007</a:t>
+            </a:fld>
+            <a:endParaRPr lang="en-US"/>
+          </a:p>
+        </p:txBody>
+      </p:sp>
+      <p:sp>
+        <p:nvSpPr>
+          <p:cNvPr id="6" name="Rectangle 5"/>
+          <p:cNvSpPr>
+            <a:spLocks noGrp="1"/>
+          </p:cNvSpPr>
+          <p:nvPr>
+            <p:ph type="ftr" sz="quarter" idx="14"/>
+          </p:nvPr>
+        </p:nvSpPr>
+        <p:spPr>
+          <a:ln/>
+        </p:spPr>
+        <p:txBody>
+          <a:bodyPr/>
+          <a:lstStyle>
+            <a:lvl1pPr>
+              <a:defRPr/>
+            </a:lvl1pPr>
+          </a:lstStyle>
+          <a:p>
+            <a:endParaRPr lang="en-US"/>
+          </a:p>
+        </p:txBody>
+      </p:sp>
+      <p:sp>
+        <p:nvSpPr>
+          <p:cNvPr id="7" name="Rectangle 6"/>
+          <p:cNvSpPr>
+            <a:spLocks noGrp="1"/>
+          </p:cNvSpPr>
+          <p:nvPr>
+            <p:ph type="sldNum" sz="quarter" idx="15"/>
+          </p:nvPr>
+        </p:nvSpPr>
+        <p:spPr>
+          <a:ln/>
+        </p:spPr>
+        <p:txBody>
+          <a:bodyPr/>
+          <a:lstStyle>
+            <a:lvl1pPr>
+              <a:defRPr/>
+            </a:lvl1pPr>
+          </a:lstStyle>
+          <a:p>
+            <a:fld id="{8FF3CCF7-7DDD-4309-A484-4757746B24B1}" type="slidenum">
+              <a:rPr lang="en-US"/>
+              <a:pPr/>
+              <a:t>‹#›</a:t>
+            </a:fld>
+            <a:endParaRPr lang="en-US"/>
+          </a:p>
+        </p:txBody>
+      </p:sp>
+    </p:spTree>
+  </p:cSld>
+  <p:clrMapOvr>
+    <a:masterClrMapping/>
+  </p:clrMapOvr>
+</p:sldLayout>
+</file>
+
+<file path=ppt/slideLayouts/slideLayout5.xml><?xml version="1.0" encoding="utf-8"?>
+<p:sldLayout xmlns:a="http://schemas.openxmlformats.org/drawingml/2006/main" xmlns:r="http://schemas.openxmlformats.org/officeDocument/2006/relationships" xmlns:p="http://schemas.openxmlformats.org/presentationml/2006/main" type="twoObj" preserve="1">
+  <p:cSld name="Title and 2 Content">
+    <p:spTree>
+      <p:nvGrpSpPr>
+        <p:cNvPr id="1" name=""/>
+        <p:cNvGrpSpPr/>
+        <p:nvPr/>
+      </p:nvGrpSpPr>
+      <p:grpSpPr>
+        <a:xfrm>
+          <a:off x="0" y="0"/>
+          <a:ext cx="0" cy="0"/>
+          <a:chOff x="0" y="0"/>
+          <a:chExt cx="0" cy="0"/>
+        </a:xfrm>
+      </p:grpSpPr>
+      <p:sp>
+        <p:nvSpPr>
+          <p:cNvPr id="2" name="Rectangle 2"/>
+          <p:cNvSpPr>
+            <a:spLocks noGrp="1"/>
+          </p:cNvSpPr>
+          <p:nvPr>
+            <p:ph type="title"/>
+          </p:nvPr>
+        </p:nvSpPr>
+        <p:spPr/>
+        <p:txBody>
+          <a:bodyPr/>
+          <a:lstStyle/>
+          <a:p>
+            <a:r>
+              <a:rPr lang="en-US" smtClean="0"/>
+              <a:t>Click to edit Master title style</a:t>
+            </a:r>
+            <a:endParaRPr lang="en-US"/>
+          </a:p>
+        </p:txBody>
+      </p:sp>
+      <p:sp>
+        <p:nvSpPr>
+          <p:cNvPr id="25" name="Rectangle 3"/>
+          <p:cNvSpPr>
+            <a:spLocks noGrp="1"/>
+          </p:cNvSpPr>
+          <p:nvPr>
+            <p:ph sz="half" idx="1"/>
+          </p:nvPr>
+        </p:nvSpPr>
+        <p:spPr>
+          <a:xfrm>
+            <a:off x="457200" y="1600200"/>
+            <a:ext cx="4038600" cy="4525963"/>
+          </a:xfrm>
+        </p:spPr>
+        <p:txBody>
+          <a:bodyPr/>
+          <a:lstStyle/>
+          <a:p>
+            <a:pPr lvl="0"/>
+            <a:r>
+              <a:rPr lang="en-US" smtClean="0"/>
+              <a:t>Click to edit Master text styles</a:t>
+            </a:r>
+          </a:p>
+          <a:p>
+            <a:pPr lvl="1"/>
+            <a:r>
+              <a:rPr lang="en-US" smtClean="0"/>
+              <a:t>Second level</a:t>
+            </a:r>
+          </a:p>
+          <a:p>
+            <a:pPr lvl="2"/>
+            <a:r>
+              <a:rPr lang="en-US" smtClean="0"/>
+              <a:t>Third level</a:t>
+            </a:r>
+          </a:p>
+          <a:p>
+            <a:pPr lvl="3"/>
+            <a:r>
+              <a:rPr lang="en-US" smtClean="0"/>
+              <a:t>Fourth level</a:t>
+            </a:r>
+          </a:p>
+          <a:p>
+            <a:pPr lvl="4"/>
+            <a:r>
+              <a:rPr lang="en-US" smtClean="0"/>
+              <a:t>Fifth level</a:t>
+            </a:r>
+            <a:endParaRPr lang="en-US"/>
+          </a:p>
+        </p:txBody>
+      </p:sp>
+      <p:sp>
+        <p:nvSpPr>
+          <p:cNvPr id="18" name="Rectangle 4"/>
+          <p:cNvSpPr>
+            <a:spLocks noGrp="1"/>
+          </p:cNvSpPr>
+          <p:nvPr>
+            <p:ph sz="half" idx="2"/>
+          </p:nvPr>
+        </p:nvSpPr>
+        <p:spPr>
+          <a:xfrm>
+            <a:off x="4648200" y="1600200"/>
+            <a:ext cx="4038600" cy="4525963"/>
+          </a:xfrm>
+        </p:spPr>
+        <p:txBody>
+          <a:bodyPr/>
+          <a:lstStyle/>
+          <a:p>
+            <a:pPr lvl="0"/>
+            <a:r>
+              <a:rPr lang="en-US" smtClean="0"/>
+              <a:t>Click to edit Master text styles</a:t>
+            </a:r>
+          </a:p>
+          <a:p>
+            <a:pPr lvl="1"/>
+            <a:r>
+              <a:rPr lang="en-US" smtClean="0"/>
+              <a:t>Second level</a:t>
+            </a:r>
+          </a:p>
+          <a:p>
+            <a:pPr lvl="2"/>
+            <a:r>
+              <a:rPr lang="en-US" smtClean="0"/>
+              <a:t>Third level</a:t>
+            </a:r>
+          </a:p>
+          <a:p>
+            <a:pPr lvl="3"/>
+            <a:r>
+              <a:rPr lang="en-US" smtClean="0"/>
+              <a:t>Fourth level</a:t>
+            </a:r>
+          </a:p>
+          <a:p>
+            <a:pPr lvl="4"/>
+            <a:r>
+              <a:rPr lang="en-US" smtClean="0"/>
+              <a:t>Fifth level</a:t>
+            </a:r>
+            <a:endParaRPr lang="en-US"/>
+          </a:p>
+        </p:txBody>
+      </p:sp>
+      <p:sp>
+        <p:nvSpPr>
+          <p:cNvPr id="26" name="Rectangle 5"/>
+          <p:cNvSpPr>
+            <a:spLocks noGrp="1"/>
+          </p:cNvSpPr>
+          <p:nvPr>
+            <p:ph type="dt" sz="half" idx="10"/>
+          </p:nvPr>
+        </p:nvSpPr>
+        <p:spPr>
+          <a:xfrm>
+            <a:off x="457200" y="6245225"/>
+            <a:ext cx="2133600" cy="476250"/>
+          </a:xfrm>
+          <a:prstGeom prst="rect">
+            <a:avLst/>
+          </a:prstGeom>
+          <a:noFill/>
+          <a:ln/>
+          <a:effectLst/>
+        </p:spPr>
+        <p:txBody>
+          <a:bodyPr/>
+          <a:lstStyle>
+            <a:lvl1pPr eaLnBrk="1" fontAlgn="auto">
+              <a:spcBef>
+                <a:spcPts val="0"/>
+              </a:spcBef>
+              <a:spcAft>
+                <a:spcPts val="0"/>
+              </a:spcAft>
+              <a:defRPr kern="0">
+                <a:latin typeface="+mn-lt"/>
+              </a:defRPr>
+            </a:lvl1pPr>
+          </a:lstStyle>
+          <a:p>
+            <a:pPr>
+              <a:defRPr/>
+            </a:pPr>
+            <a:fld id="{8E4C7396-2819-4CD4-A770-B073660FAD0A}" type="datetimeFigureOut">
+              <a:rPr lang="en-US"/>
+              <a:pPr>
+                <a:defRPr/>
+              </a:pPr>
+              <a:t>8/14/2007</a:t>
+            </a:fld>
+            <a:endParaRPr lang="en-US"/>
+          </a:p>
+        </p:txBody>
+      </p:sp>
+      <p:sp>
+        <p:nvSpPr>
+          <p:cNvPr id="22" name="Rectangle 6"/>
+          <p:cNvSpPr>
+            <a:spLocks noGrp="1"/>
+          </p:cNvSpPr>
+          <p:nvPr>
+            <p:ph type="ftr" sz="quarter" idx="11"/>
+          </p:nvPr>
+        </p:nvSpPr>
+        <p:spPr>
+          <a:xfrm>
+            <a:off x="3124200" y="6245225"/>
+            <a:ext cx="2895600" cy="476250"/>
+          </a:xfrm>
+          <a:prstGeom prst="rect">
+            <a:avLst/>
+          </a:prstGeom>
+          <a:noFill/>
+          <a:ln/>
+          <a:effectLst/>
+        </p:spPr>
+        <p:txBody>
+          <a:bodyPr/>
+          <a:lstStyle>
+            <a:lvl1pPr eaLnBrk="1" fontAlgn="auto">
+              <a:spcBef>
+                <a:spcPts val="0"/>
+              </a:spcBef>
+              <a:spcAft>
+                <a:spcPts val="0"/>
+              </a:spcAft>
+              <a:defRPr kern="0">
+                <a:latin typeface="+mn-lt"/>
+              </a:defRPr>
+            </a:lvl1pPr>
+          </a:lstStyle>
+          <a:p>
+            <a:pPr>
+              <a:defRPr/>
+            </a:pPr>
+            <a:endParaRPr lang="en-US"/>
+          </a:p>
+        </p:txBody>
+      </p:sp>
+      <p:sp>
+        <p:nvSpPr>
+          <p:cNvPr id="28" name="Rectangle 7"/>
+          <p:cNvSpPr>
+            <a:spLocks noGrp="1"/>
+          </p:cNvSpPr>
+          <p:nvPr>
+            <p:ph type="sldNum" sz="quarter" idx="12"/>
+          </p:nvPr>
+        </p:nvSpPr>
+        <p:spPr>
+          <a:xfrm>
+            <a:off x="6553200" y="6245225"/>
+            <a:ext cx="2133600" cy="476250"/>
+          </a:xfrm>
+          <a:prstGeom prst="rect">
+            <a:avLst/>
+          </a:prstGeom>
+          <a:noFill/>
+          <a:ln/>
+          <a:effectLst/>
+        </p:spPr>
+        <p:txBody>
+          <a:bodyPr/>
+          <a:lstStyle>
+            <a:lvl1pPr eaLnBrk="1" fontAlgn="auto">
+              <a:spcBef>
+                <a:spcPts val="0"/>
+              </a:spcBef>
+              <a:spcAft>
+                <a:spcPts val="0"/>
+              </a:spcAft>
+              <a:defRPr kern="0">
+                <a:latin typeface="+mn-lt"/>
+              </a:defRPr>
+            </a:lvl1pPr>
+          </a:lstStyle>
+          <a:p>
+            <a:pPr>
+              <a:defRPr/>
+            </a:pPr>
+            <a:fld id="{33095D0D-EA5D-47FC-839A-8678A04B988F}" type="slidenum">
+              <a:rPr lang="en-US"/>
+              <a:pPr>
+                <a:defRPr/>
+              </a:pPr>
+              <a:t>‹#›</a:t>
+            </a:fld>
+            <a:endParaRPr lang="en-US"/>
+          </a:p>
+        </p:txBody>
+      </p:sp>
+      <p:sp>
+        <p:nvSpPr>
+          <p:cNvPr id="8" name="Rectangle 4"/>
+          <p:cNvSpPr>
+            <a:spLocks noGrp="1"/>
+          </p:cNvSpPr>
+          <p:nvPr>
+            <p:ph type="dt" sz="half" idx="13"/>
+          </p:nvPr>
+        </p:nvSpPr>
+        <p:spPr>
+          <a:ln/>
+        </p:spPr>
+        <p:txBody>
+          <a:bodyPr/>
+          <a:lstStyle>
+            <a:lvl1pPr>
+              <a:defRPr/>
+            </a:lvl1pPr>
+          </a:lstStyle>
+          <a:p>
+            <a:fld id="{FCFDADFA-EB9D-4010-884E-0ED9201A937C}" type="datetime1">
+              <a:rPr lang="en-US"/>
+              <a:pPr/>
+              <a:t>8/14/2007</a:t>
+            </a:fld>
+            <a:endParaRPr lang="en-US"/>
+          </a:p>
+        </p:txBody>
+      </p:sp>
+      <p:sp>
+        <p:nvSpPr>
+          <p:cNvPr id="9" name="Rectangle 5"/>
+          <p:cNvSpPr>
+            <a:spLocks noGrp="1"/>
+          </p:cNvSpPr>
+          <p:nvPr>
+            <p:ph type="ftr" sz="quarter" idx="14"/>
+          </p:nvPr>
+        </p:nvSpPr>
+        <p:spPr>
+          <a:ln/>
+        </p:spPr>
+        <p:txBody>
+          <a:bodyPr/>
+          <a:lstStyle>
+            <a:lvl1pPr>
+              <a:defRPr/>
+            </a:lvl1pPr>
+          </a:lstStyle>
+          <a:p>
+            <a:endParaRPr lang="en-US"/>
+          </a:p>
+        </p:txBody>
+      </p:sp>
+      <p:sp>
+        <p:nvSpPr>
+          <p:cNvPr id="10" name="Rectangle 6"/>
+          <p:cNvSpPr>
+            <a:spLocks noGrp="1"/>
+          </p:cNvSpPr>
+          <p:nvPr>
+            <p:ph type="sldNum" sz="quarter" idx="15"/>
+          </p:nvPr>
+        </p:nvSpPr>
+        <p:spPr>
+          <a:ln/>
+        </p:spPr>
+        <p:txBody>
+          <a:bodyPr/>
+          <a:lstStyle>
+            <a:lvl1pPr>
+              <a:defRPr/>
+            </a:lvl1pPr>
+          </a:lstStyle>
+          <a:p>
+            <a:fld id="{D2D47FF6-4A28-4488-8B1D-202C72B75D5C}" type="slidenum">
+              <a:rPr lang="en-US"/>
+              <a:pPr/>
+              <a:t>‹#›</a:t>
+            </a:fld>
+            <a:endParaRPr lang="en-US"/>
+          </a:p>
+        </p:txBody>
+      </p:sp>
+    </p:spTree>
+  </p:cSld>
+  <p:clrMapOvr>
+    <a:masterClrMapping/>
+  </p:clrMapOvr>
+</p:sldLayout>
+</file>
+
+<file path=ppt/slideLayouts/slideLayout6.xml><?xml version="1.0" encoding="utf-8"?>
+<p:sldLayout xmlns:a="http://schemas.openxmlformats.org/drawingml/2006/main" xmlns:r="http://schemas.openxmlformats.org/officeDocument/2006/relationships" xmlns:p="http://schemas.openxmlformats.org/presentationml/2006/main" type="tx" preserve="1">
+  <p:cSld name="Title and Text">
+    <p:spTree>
+      <p:nvGrpSpPr>
+        <p:cNvPr id="1" name=""/>
+        <p:cNvGrpSpPr/>
+        <p:nvPr/>
+      </p:nvGrpSpPr>
+      <p:grpSpPr>
+        <a:xfrm>
+          <a:off x="0" y="0"/>
+          <a:ext cx="0" cy="0"/>
+          <a:chOff x="0" y="0"/>
+          <a:chExt cx="0" cy="0"/>
+        </a:xfrm>
+      </p:grpSpPr>
+      <p:sp>
+        <p:nvSpPr>
+          <p:cNvPr id="21" name="Rectangle 2"/>
+          <p:cNvSpPr>
+            <a:spLocks noGrp="1"/>
+          </p:cNvSpPr>
+          <p:nvPr>
+            <p:ph type="title"/>
+          </p:nvPr>
+        </p:nvSpPr>
+        <p:spPr/>
+        <p:txBody>
+          <a:bodyPr/>
+          <a:lstStyle/>
+          <a:p>
+            <a:r>
+              <a:rPr lang="en-US" smtClean="0"/>
+              <a:t>Click to edit Master title style</a:t>
+            </a:r>
+            <a:endParaRPr lang="en-US"/>
+          </a:p>
+        </p:txBody>
+      </p:sp>
+      <p:sp>
+        <p:nvSpPr>
+          <p:cNvPr id="18" name="Rectangle 3"/>
+          <p:cNvSpPr>
+            <a:spLocks noGrp="1"/>
+          </p:cNvSpPr>
+          <p:nvPr>
+            <p:ph type="body" idx="1"/>
+          </p:nvPr>
+        </p:nvSpPr>
+        <p:spPr/>
+        <p:txBody>
+          <a:bodyPr/>
+          <a:lstStyle/>
+          <a:p>
+            <a:pPr lvl="0"/>
+            <a:r>
+              <a:rPr lang="en-US" smtClean="0"/>
+              <a:t>Click to edit Master text styles</a:t>
+            </a:r>
+          </a:p>
+          <a:p>
+            <a:pPr lvl="1"/>
+            <a:r>
+              <a:rPr lang="en-US" smtClean="0"/>
+              <a:t>Second level</a:t>
+            </a:r>
+          </a:p>
+          <a:p>
+            <a:pPr lvl="2"/>
+            <a:r>
+              <a:rPr lang="en-US" smtClean="0"/>
+              <a:t>Third level</a:t>
+            </a:r>
+          </a:p>
+          <a:p>
+            <a:pPr lvl="3"/>
+            <a:r>
+              <a:rPr lang="en-US" smtClean="0"/>
+              <a:t>Fourth level</a:t>
+            </a:r>
+          </a:p>
+          <a:p>
+            <a:pPr lvl="4"/>
+            <a:r>
+              <a:rPr lang="en-US" smtClean="0"/>
+              <a:t>Fifth level</a:t>
+            </a:r>
+            <a:endParaRPr lang="en-US"/>
+          </a:p>
+        </p:txBody>
+      </p:sp>
+      <p:sp>
+        <p:nvSpPr>
+          <p:cNvPr id="12" name="Rectangle 4"/>
+          <p:cNvSpPr>
+            <a:spLocks noGrp="1"/>
+          </p:cNvSpPr>
+          <p:nvPr>
+            <p:ph type="dt" sz="half" idx="10"/>
+          </p:nvPr>
+        </p:nvSpPr>
+        <p:spPr>
+          <a:xfrm>
+            <a:off x="457200" y="6245225"/>
+            <a:ext cx="2133600" cy="476250"/>
+          </a:xfrm>
+          <a:prstGeom prst="rect">
+            <a:avLst/>
+          </a:prstGeom>
+          <a:noFill/>
+          <a:ln/>
+          <a:effectLst/>
+        </p:spPr>
+        <p:txBody>
+          <a:bodyPr/>
+          <a:lstStyle>
+            <a:lvl1pPr eaLnBrk="1" fontAlgn="auto">
+              <a:spcBef>
+                <a:spcPts val="0"/>
+              </a:spcBef>
+              <a:spcAft>
+                <a:spcPts val="0"/>
+              </a:spcAft>
+              <a:defRPr kern="0">
+                <a:latin typeface="+mn-lt"/>
+              </a:defRPr>
+            </a:lvl1pPr>
+          </a:lstStyle>
+          <a:p>
+            <a:pPr>
+              <a:defRPr/>
+            </a:pPr>
+            <a:fld id="{8E4C7396-2819-4CD4-A770-B073660FAD0A}" type="datetimeFigureOut">
+              <a:rPr lang="en-US"/>
+              <a:pPr>
+                <a:defRPr/>
+              </a:pPr>
+              <a:t>8/14/2007</a:t>
+            </a:fld>
+            <a:endParaRPr lang="en-US"/>
+          </a:p>
+        </p:txBody>
+      </p:sp>
+      <p:sp>
+        <p:nvSpPr>
+          <p:cNvPr id="3" name="Rectangle 5"/>
+          <p:cNvSpPr>
+            <a:spLocks noGrp="1"/>
+          </p:cNvSpPr>
+          <p:nvPr>
+            <p:ph type="ftr" sz="quarter" idx="11"/>
+          </p:nvPr>
+        </p:nvSpPr>
+        <p:spPr>
+          <a:xfrm>
+            <a:off x="3124200" y="6245225"/>
+            <a:ext cx="2895600" cy="476250"/>
+          </a:xfrm>
+          <a:prstGeom prst="rect">
+            <a:avLst/>
+          </a:prstGeom>
+          <a:noFill/>
+          <a:ln/>
+          <a:effectLst/>
+        </p:spPr>
+        <p:txBody>
+          <a:bodyPr/>
+          <a:lstStyle>
+            <a:lvl1pPr eaLnBrk="1" fontAlgn="auto">
+              <a:spcBef>
+                <a:spcPts val="0"/>
+              </a:spcBef>
+              <a:spcAft>
+                <a:spcPts val="0"/>
+              </a:spcAft>
+              <a:defRPr kern="0">
+                <a:latin typeface="+mn-lt"/>
+              </a:defRPr>
+            </a:lvl1pPr>
+          </a:lstStyle>
+          <a:p>
+            <a:pPr>
+              <a:defRPr/>
+            </a:pPr>
+            <a:endParaRPr lang="en-US"/>
+          </a:p>
+        </p:txBody>
+      </p:sp>
+      <p:sp>
+        <p:nvSpPr>
+          <p:cNvPr id="31" name="Rectangle 6"/>
+          <p:cNvSpPr>
+            <a:spLocks noGrp="1"/>
+          </p:cNvSpPr>
+          <p:nvPr>
+            <p:ph type="sldNum" sz="quarter" idx="12"/>
+          </p:nvPr>
+        </p:nvSpPr>
+        <p:spPr>
+          <a:xfrm>
+            <a:off x="6553200" y="6245225"/>
+            <a:ext cx="2133600" cy="476250"/>
+          </a:xfrm>
+          <a:prstGeom prst="rect">
+            <a:avLst/>
+          </a:prstGeom>
+          <a:noFill/>
+          <a:ln/>
+          <a:effectLst/>
+        </p:spPr>
+        <p:txBody>
+          <a:bodyPr/>
+          <a:lstStyle>
+            <a:lvl1pPr eaLnBrk="1" fontAlgn="auto">
+              <a:spcBef>
+                <a:spcPts val="0"/>
+              </a:spcBef>
+              <a:spcAft>
+                <a:spcPts val="0"/>
+              </a:spcAft>
+              <a:defRPr kern="0">
+                <a:latin typeface="+mn-lt"/>
+              </a:defRPr>
+            </a:lvl1pPr>
+          </a:lstStyle>
+          <a:p>
+            <a:pPr>
+              <a:defRPr/>
+            </a:pPr>
+            <a:fld id="{B9A37EA7-9360-4B84-A612-359AA9F63F4C}" type="slidenum">
+              <a:rPr lang="en-US"/>
+              <a:pPr>
+                <a:defRPr/>
+              </a:pPr>
+              <a:t>‹#›</a:t>
+            </a:fld>
+            <a:endParaRPr lang="en-US"/>
+          </a:p>
+        </p:txBody>
+      </p:sp>
+      <p:sp>
+        <p:nvSpPr>
+          <p:cNvPr id="7" name="Rectangle 4"/>
+          <p:cNvSpPr>
+            <a:spLocks noGrp="1"/>
+          </p:cNvSpPr>
+          <p:nvPr>
+            <p:ph type="dt" sz="half" idx="13"/>
+          </p:nvPr>
+        </p:nvSpPr>
+        <p:spPr>
+          <a:ln/>
+        </p:spPr>
+        <p:txBody>
+          <a:bodyPr/>
+          <a:lstStyle>
+            <a:lvl1pPr>
+              <a:defRPr/>
+            </a:lvl1pPr>
+          </a:lstStyle>
+          <a:p>
+            <a:fld id="{FCFDADFA-EB9D-4010-884E-0ED9201A937C}" type="datetime1">
+              <a:rPr lang="en-US"/>
+              <a:pPr/>
+              <a:t>8/14/2007</a:t>
+            </a:fld>
+            <a:endParaRPr lang="en-US"/>
+          </a:p>
+        </p:txBody>
+      </p:sp>
+      <p:sp>
+        <p:nvSpPr>
+          <p:cNvPr id="8" name="Rectangle 5"/>
+          <p:cNvSpPr>
+            <a:spLocks noGrp="1"/>
+          </p:cNvSpPr>
+          <p:nvPr>
+            <p:ph type="ftr" sz="quarter" idx="14"/>
+          </p:nvPr>
+        </p:nvSpPr>
+        <p:spPr>
+          <a:ln/>
+        </p:spPr>
+        <p:txBody>
+          <a:bodyPr/>
+          <a:lstStyle>
+            <a:lvl1pPr>
+              <a:defRPr/>
+            </a:lvl1pPr>
+          </a:lstStyle>
+          <a:p>
+            <a:endParaRPr lang="en-US"/>
+          </a:p>
+        </p:txBody>
+      </p:sp>
+      <p:sp>
+        <p:nvSpPr>
+          <p:cNvPr id="9" name="Rectangle 6"/>
+          <p:cNvSpPr>
+            <a:spLocks noGrp="1"/>
+          </p:cNvSpPr>
+          <p:nvPr>
+            <p:ph type="sldNum" sz="quarter" idx="15"/>
+          </p:nvPr>
+        </p:nvSpPr>
+        <p:spPr>
+          <a:ln/>
+        </p:spPr>
+        <p:txBody>
+          <a:bodyPr/>
+          <a:lstStyle>
+            <a:lvl1pPr>
+              <a:defRPr/>
+            </a:lvl1pPr>
+          </a:lstStyle>
+          <a:p>
+            <a:fld id="{5FEB45FB-2AD7-44BE-8130-8972D151B84D}" type="slidenum">
+              <a:rPr lang="en-US"/>
+              <a:pPr/>
+              <a:t>‹#›</a:t>
+            </a:fld>
+            <a:endParaRPr lang="en-US"/>
+          </a:p>
+        </p:txBody>
+      </p:sp>
+    </p:spTree>
+  </p:cSld>
+  <p:clrMapOvr>
+    <a:masterClrMapping/>
+  </p:clrMapOvr>
+</p:sldLayout>
+</file>
+
+<file path=ppt/slideLayouts/slideLayout7.xml><?xml version="1.0" encoding="utf-8"?>
+<p:sldLayout xmlns:a="http://schemas.openxmlformats.org/drawingml/2006/main" xmlns:r="http://schemas.openxmlformats.org/officeDocument/2006/relationships" xmlns:p="http://schemas.openxmlformats.org/presentationml/2006/main" type="twoColTx" preserve="1">
+  <p:cSld name="Title and 2-Column Text">
+    <p:spTree>
+      <p:nvGrpSpPr>
+        <p:cNvPr id="1" name=""/>
+        <p:cNvGrpSpPr/>
+        <p:nvPr/>
+      </p:nvGrpSpPr>
+      <p:grpSpPr>
+        <a:xfrm>
+          <a:off x="0" y="0"/>
+          <a:ext cx="0" cy="0"/>
+          <a:chOff x="0" y="0"/>
+          <a:chExt cx="0" cy="0"/>
+        </a:xfrm>
+      </p:grpSpPr>
+      <p:sp>
+        <p:nvSpPr>
+          <p:cNvPr id="5" name="Rectangle 2"/>
+          <p:cNvSpPr>
+            <a:spLocks noGrp="1"/>
+          </p:cNvSpPr>
+          <p:nvPr>
+            <p:ph type="title"/>
+          </p:nvPr>
+        </p:nvSpPr>
+        <p:spPr/>
+        <p:txBody>
+          <a:bodyPr/>
+          <a:lstStyle/>
+          <a:p>
+            <a:r>
+              <a:rPr lang="en-US" smtClean="0"/>
+              <a:t>Click to edit Master title style</a:t>
+            </a:r>
+            <a:endParaRPr lang="en-US"/>
+          </a:p>
+        </p:txBody>
+      </p:sp>
+      <p:sp>
+        <p:nvSpPr>
+          <p:cNvPr id="13" name="Rectangle 3"/>
+          <p:cNvSpPr>
+            <a:spLocks noGrp="1"/>
+          </p:cNvSpPr>
+          <p:nvPr>
+            <p:ph type="body" sz="half" idx="1"/>
+          </p:nvPr>
+        </p:nvSpPr>
+        <p:spPr>
+          <a:xfrm>
+            <a:off x="457200" y="1600200"/>
+            <a:ext cx="4038600" cy="4525963"/>
+          </a:xfrm>
+        </p:spPr>
+        <p:txBody>
+          <a:bodyPr/>
+          <a:lstStyle/>
+          <a:p>
+            <a:pPr lvl="0"/>
+            <a:r>
+              <a:rPr lang="en-US" smtClean="0"/>
+              <a:t>Click to edit Master text styles</a:t>
+            </a:r>
+          </a:p>
+          <a:p>
+            <a:pPr lvl="1"/>
+            <a:r>
+              <a:rPr lang="en-US" smtClean="0"/>
+              <a:t>Second level</a:t>
+            </a:r>
+          </a:p>
+          <a:p>
+            <a:pPr lvl="2"/>
+            <a:r>
+              <a:rPr lang="en-US" smtClean="0"/>
+              <a:t>Third level</a:t>
+            </a:r>
+          </a:p>
+          <a:p>
+            <a:pPr lvl="3"/>
+            <a:r>
+              <a:rPr lang="en-US" smtClean="0"/>
+              <a:t>Fourth level</a:t>
+            </a:r>
+          </a:p>
+          <a:p>
+            <a:pPr lvl="4"/>
+            <a:r>
+              <a:rPr lang="en-US" smtClean="0"/>
+              <a:t>Fifth level</a:t>
+            </a:r>
+            <a:endParaRPr lang="en-US"/>
+          </a:p>
+        </p:txBody>
+      </p:sp>
+      <p:sp>
+        <p:nvSpPr>
+          <p:cNvPr id="9" name="Rectangle 4"/>
+          <p:cNvSpPr>
+            <a:spLocks noGrp="1"/>
+          </p:cNvSpPr>
+          <p:nvPr>
+            <p:ph type="body" sz="half" idx="2"/>
+          </p:nvPr>
+        </p:nvSpPr>
+        <p:spPr>
+          <a:xfrm>
+            <a:off x="4648200" y="1600200"/>
+            <a:ext cx="4038600" cy="4525963"/>
+          </a:xfrm>
+        </p:spPr>
+        <p:txBody>
+          <a:bodyPr/>
+          <a:lstStyle/>
+          <a:p>
+            <a:pPr lvl="0"/>
+            <a:r>
+              <a:rPr lang="en-US" smtClean="0"/>
+              <a:t>Click to edit Master text styles</a:t>
+            </a:r>
+          </a:p>
+          <a:p>
+            <a:pPr lvl="1"/>
+            <a:r>
+              <a:rPr lang="en-US" smtClean="0"/>
+              <a:t>Second level</a:t>
+            </a:r>
+          </a:p>
+          <a:p>
+            <a:pPr lvl="2"/>
+            <a:r>
+              <a:rPr lang="en-US" smtClean="0"/>
+              <a:t>Third level</a:t>
+            </a:r>
+          </a:p>
+          <a:p>
+            <a:pPr lvl="3"/>
+            <a:r>
+              <a:rPr lang="en-US" smtClean="0"/>
+              <a:t>Fourth level</a:t>
+            </a:r>
+          </a:p>
+          <a:p>
+            <a:pPr lvl="4"/>
+            <a:r>
+              <a:rPr lang="en-US" smtClean="0"/>
+              <a:t>Fifth level</a:t>
+            </a:r>
+            <a:endParaRPr lang="en-US"/>
+          </a:p>
+        </p:txBody>
+      </p:sp>
+      <p:sp>
+        <p:nvSpPr>
+          <p:cNvPr id="7" name="Rectangle 5"/>
+          <p:cNvSpPr>
+            <a:spLocks noGrp="1"/>
+          </p:cNvSpPr>
+          <p:nvPr>
+            <p:ph type="dt" sz="half" idx="10"/>
+          </p:nvPr>
+        </p:nvSpPr>
+        <p:spPr>
+          <a:xfrm>
+            <a:off x="457200" y="6245225"/>
+            <a:ext cx="2133600" cy="476250"/>
+          </a:xfrm>
+          <a:prstGeom prst="rect">
+            <a:avLst/>
+          </a:prstGeom>
+          <a:noFill/>
+          <a:ln/>
+          <a:effectLst/>
+        </p:spPr>
+        <p:txBody>
+          <a:bodyPr/>
+          <a:lstStyle>
+            <a:lvl1pPr eaLnBrk="1" fontAlgn="auto">
+              <a:spcBef>
+                <a:spcPts val="0"/>
+              </a:spcBef>
+              <a:spcAft>
+                <a:spcPts val="0"/>
+              </a:spcAft>
+              <a:defRPr kern="0">
+                <a:latin typeface="+mn-lt"/>
+              </a:defRPr>
+            </a:lvl1pPr>
+          </a:lstStyle>
+          <a:p>
+            <a:pPr>
+              <a:defRPr/>
+            </a:pPr>
+            <a:fld id="{8E4C7396-2819-4CD4-A770-B073660FAD0A}" type="datetimeFigureOut">
+              <a:rPr lang="en-US"/>
+              <a:pPr>
+                <a:defRPr/>
+              </a:pPr>
+              <a:t>8/14/2007</a:t>
+            </a:fld>
+            <a:endParaRPr lang="en-US"/>
+          </a:p>
+        </p:txBody>
+      </p:sp>
+      <p:sp>
+        <p:nvSpPr>
+          <p:cNvPr id="3" name="Rectangle 6"/>
+          <p:cNvSpPr>
+            <a:spLocks noGrp="1"/>
+          </p:cNvSpPr>
+          <p:nvPr>
+            <p:ph type="ftr" sz="quarter" idx="11"/>
+          </p:nvPr>
+        </p:nvSpPr>
+        <p:spPr>
+          <a:xfrm>
+            <a:off x="3124200" y="6245225"/>
+            <a:ext cx="2895600" cy="476250"/>
+          </a:xfrm>
+          <a:prstGeom prst="rect">
+            <a:avLst/>
+          </a:prstGeom>
+          <a:noFill/>
+          <a:ln/>
+          <a:effectLst/>
+        </p:spPr>
+        <p:txBody>
+          <a:bodyPr/>
+          <a:lstStyle>
+            <a:lvl1pPr eaLnBrk="1" fontAlgn="auto">
+              <a:spcBef>
+                <a:spcPts val="0"/>
+              </a:spcBef>
+              <a:spcAft>
+                <a:spcPts val="0"/>
+              </a:spcAft>
+              <a:defRPr kern="0">
+                <a:latin typeface="+mn-lt"/>
+              </a:defRPr>
+            </a:lvl1pPr>
+          </a:lstStyle>
+          <a:p>
+            <a:pPr>
+              <a:defRPr/>
+            </a:pPr>
+            <a:endParaRPr lang="en-US"/>
+          </a:p>
+        </p:txBody>
+      </p:sp>
+      <p:sp>
+        <p:nvSpPr>
+          <p:cNvPr id="2" name="Rectangle 7"/>
+          <p:cNvSpPr>
+            <a:spLocks noGrp="1"/>
+          </p:cNvSpPr>
+          <p:nvPr>
+            <p:ph type="sldNum" sz="quarter" idx="12"/>
+          </p:nvPr>
+        </p:nvSpPr>
+        <p:spPr>
+          <a:xfrm>
+            <a:off x="6553200" y="6245225"/>
+            <a:ext cx="2133600" cy="476250"/>
+          </a:xfrm>
+          <a:prstGeom prst="rect">
+            <a:avLst/>
+          </a:prstGeom>
+          <a:noFill/>
+          <a:ln/>
+          <a:effectLst/>
+        </p:spPr>
+        <p:txBody>
+          <a:bodyPr/>
+          <a:lstStyle>
+            <a:lvl1pPr eaLnBrk="1" fontAlgn="auto">
+              <a:spcBef>
+                <a:spcPts val="0"/>
+              </a:spcBef>
+              <a:spcAft>
+                <a:spcPts val="0"/>
+              </a:spcAft>
+              <a:defRPr kern="0">
+                <a:latin typeface="+mn-lt"/>
+              </a:defRPr>
+            </a:lvl1pPr>
+          </a:lstStyle>
+          <a:p>
+            <a:pPr>
+              <a:defRPr/>
+            </a:pPr>
+            <a:fld id="{ECA37C99-C515-4ABD-A43D-A9DF776BCB9E}" type="slidenum">
+              <a:rPr lang="en-US"/>
+              <a:pPr>
+                <a:defRPr/>
+              </a:pPr>
+              <a:t>‹#›</a:t>
+            </a:fld>
+            <a:endParaRPr lang="en-US"/>
+          </a:p>
+        </p:txBody>
+      </p:sp>
+      <p:sp>
+        <p:nvSpPr>
+          <p:cNvPr id="8" name="Rectangle 4"/>
+          <p:cNvSpPr>
+            <a:spLocks noGrp="1"/>
+          </p:cNvSpPr>
+          <p:nvPr>
+            <p:ph type="dt" sz="half" idx="13"/>
+          </p:nvPr>
+        </p:nvSpPr>
+        <p:spPr>
+          <a:ln/>
+        </p:spPr>
+        <p:txBody>
+          <a:bodyPr/>
+          <a:lstStyle>
+            <a:lvl1pPr>
+              <a:defRPr/>
+            </a:lvl1pPr>
+          </a:lstStyle>
+          <a:p>
+            <a:fld id="{FCFDADFA-EB9D-4010-884E-0ED9201A937C}" type="datetime1">
+              <a:rPr lang="en-US"/>
+              <a:pPr/>
+              <a:t>8/14/2007</a:t>
+            </a:fld>
+            <a:endParaRPr lang="en-US"/>
+          </a:p>
+        </p:txBody>
+      </p:sp>
+      <p:sp>
+        <p:nvSpPr>
+          <p:cNvPr id="10" name="Rectangle 5"/>
+          <p:cNvSpPr>
+            <a:spLocks noGrp="1"/>
+          </p:cNvSpPr>
+          <p:nvPr>
+            <p:ph type="ftr" sz="quarter" idx="14"/>
+          </p:nvPr>
+        </p:nvSpPr>
+        <p:spPr>
+          <a:ln/>
+        </p:spPr>
+        <p:txBody>
+          <a:bodyPr/>
+          <a:lstStyle>
+            <a:lvl1pPr>
+              <a:defRPr/>
+            </a:lvl1pPr>
+          </a:lstStyle>
+          <a:p>
+            <a:endParaRPr lang="en-US"/>
+          </a:p>
+        </p:txBody>
+      </p:sp>
+      <p:sp>
+        <p:nvSpPr>
+          <p:cNvPr id="11" name="Rectangle 6"/>
+          <p:cNvSpPr>
+            <a:spLocks noGrp="1"/>
+          </p:cNvSpPr>
+          <p:nvPr>
+            <p:ph type="sldNum" sz="quarter" idx="15"/>
+          </p:nvPr>
+        </p:nvSpPr>
+        <p:spPr>
+          <a:ln/>
+        </p:spPr>
+        <p:txBody>
+          <a:bodyPr/>
+          <a:lstStyle>
+            <a:lvl1pPr>
+              <a:defRPr/>
+            </a:lvl1pPr>
+          </a:lstStyle>
+          <a:p>
+            <a:fld id="{34EEF794-2E34-4F46-AFB6-4B05B6BA16A7}" type="slidenum">
+              <a:rPr lang="en-US"/>
+              <a:pPr/>
+              <a:t>‹#›</a:t>
+            </a:fld>
+            <a:endParaRPr lang="en-US"/>
+          </a:p>
+        </p:txBody>
+      </p:sp>
+    </p:spTree>
+  </p:cSld>
+  <p:clrMapOvr>
+    <a:masterClrMapping/>
+  </p:clrMapOvr>
+</p:sldLayout>
+</file>
+
+<file path=ppt/slideMasters/slideMaster1.xml><?xml version="1.0" encoding="utf-8"?>
+<p:sldMaster xmlns:a="http://schemas.openxmlformats.org/drawingml/2006/main" xmlns:r="http://schemas.openxmlformats.org/officeDocument/2006/relationships" xmlns:p="http://schemas.openxmlformats.org/presentationml/2006/main">
+  <p:cSld>
+    <p:bg>
+      <p:bgRef idx="1001">
+        <a:schemeClr val="bg1"/>
+      </p:bgRef>
+    </p:bg>
+    <p:spTree>
+      <p:nvGrpSpPr>
+        <p:cNvPr id="1" name=""/>
+        <p:cNvGrpSpPr/>
+        <p:nvPr/>
+      </p:nvGrpSpPr>
+      <p:grpSpPr>
+        <a:xfrm>
+          <a:off x="0" y="0"/>
+          <a:ext cx="0" cy="0"/>
+          <a:chOff x="0" y="0"/>
+          <a:chExt cx="0" cy="0"/>
+        </a:xfrm>
+      </p:grpSpPr>
+      <p:sp>
+        <p:nvSpPr>
+          <p:cNvPr id="1026" name="Rectangle 2"/>
+          <p:cNvSpPr>
+            <a:spLocks noGrp="1"/>
+          </p:cNvSpPr>
+          <p:nvPr>
+            <p:ph type="title"/>
+          </p:nvPr>
+        </p:nvSpPr>
+        <p:spPr bwMode="auto">
+          <a:xfrm>
+            <a:off x="457200" y="274638"/>
+            <a:ext cx="8229600" cy="1143000"/>
+          </a:xfrm>
+          <a:prstGeom prst="rect">
+            <a:avLst/>
+          </a:prstGeom>
+          <a:noFill/>
+          <a:ln w="9525">
+            <a:noFill/>
+            <a:miter lim="800000"/>
+            <a:headEnd/>
+            <a:tailEnd/>
+          </a:ln>
+        </p:spPr>
+        <p:txBody>
+          <a:bodyPr vert="horz" wrap="square" lIns="91440" tIns="45720" rIns="91440" bIns="45720" numCol="1" anchor="ctr" anchorCtr="0" compatLnSpc="1">
+            <a:prstTxWarp prst="textNoShape">
+              <a:avLst/>
+            </a:prstTxWarp>
+          </a:bodyPr>
+          <a:lstStyle/>
+          <a:p>
+            <a:pPr lvl="0"/>
+            <a:r>
+              <a:rPr lang="en-US" smtClean="0"/>
+              <a:t>Click to edit Master title style</a:t>
+            </a:r>
+          </a:p>
+        </p:txBody>
+      </p:sp>
+      <p:sp>
+        <p:nvSpPr>
+          <p:cNvPr id="1027" name="Rectangle 3"/>
+          <p:cNvSpPr>
+            <a:spLocks noGrp="1"/>
+          </p:cNvSpPr>
+          <p:nvPr>
+            <p:ph type="body" idx="1"/>
+          </p:nvPr>
+        </p:nvSpPr>
+        <p:spPr bwMode="auto">
+          <a:xfrm>
+            <a:off x="457200" y="1600200"/>
+            <a:ext cx="8229600" cy="4525963"/>
+          </a:xfrm>
+          <a:prstGeom prst="rect">
+            <a:avLst/>
+          </a:prstGeom>
+          <a:noFill/>
+          <a:ln w="9525">
+            <a:noFill/>
+            <a:miter lim="800000"/>
+            <a:headEnd/>
+            <a:tailEnd/>
+          </a:ln>
+        </p:spPr>
+        <p:txBody>
+          <a:bodyPr vert="horz" wrap="square" lIns="91440" tIns="45720" rIns="91440" bIns="45720" numCol="1" anchor="t" anchorCtr="0" compatLnSpc="1">
+            <a:prstTxWarp prst="textNoShape">
+              <a:avLst/>
+            </a:prstTxWarp>
+          </a:bodyPr>
+          <a:lstStyle/>
+          <a:p>
+            <a:pPr lvl="0"/>
+            <a:r>
+              <a:rPr lang="en-US" smtClean="0"/>
+              <a:t>Click to edit Master text styles</a:t>
+            </a:r>
+          </a:p>
+          <a:p>
+            <a:pPr lvl="1"/>
+            <a:r>
+              <a:rPr lang="en-US" smtClean="0"/>
+              <a:t>Second level</a:t>
+            </a:r>
+          </a:p>
+          <a:p>
+            <a:pPr lvl="2"/>
+            <a:r>
+              <a:rPr lang="en-US" smtClean="0"/>
+              <a:t>Third level</a:t>
+            </a:r>
+          </a:p>
+          <a:p>
+            <a:pPr lvl="3"/>
+            <a:r>
+              <a:rPr lang="en-US" smtClean="0"/>
+              <a:t>Fourth level</a:t>
+            </a:r>
+          </a:p>
+          <a:p>
+            <a:pPr lvl="4"/>
+            <a:r>
+              <a:rPr lang="en-US" smtClean="0"/>
+              <a:t>Fifth level</a:t>
+            </a:r>
+          </a:p>
+        </p:txBody>
+      </p:sp>
+      <p:sp>
+        <p:nvSpPr>
+          <p:cNvPr id="1028" name="Rectangle 4"/>
+          <p:cNvSpPr>
+            <a:spLocks noGrp="1"/>
+          </p:cNvSpPr>
+          <p:nvPr>
+            <p:ph type="dt" sz="half" idx="2"/>
+          </p:nvPr>
+        </p:nvSpPr>
+        <p:spPr bwMode="auto">
+          <a:xfrm>
+            <a:off x="457200" y="6245225"/>
+            <a:ext cx="2133600" cy="476250"/>
+          </a:xfrm>
+          <a:prstGeom prst="rect">
+            <a:avLst/>
+          </a:prstGeom>
+          <a:noFill/>
+          <a:ln w="9525">
+            <a:noFill/>
+            <a:miter lim="800000"/>
+            <a:headEnd/>
+            <a:tailEnd/>
+          </a:ln>
+        </p:spPr>
+        <p:txBody>
+          <a:bodyPr vert="horz" wrap="square" lIns="91440" tIns="45720" rIns="91440" bIns="45720" numCol="1" anchor="t" anchorCtr="0" compatLnSpc="1">
+            <a:prstTxWarp prst="textNoShape">
+              <a:avLst/>
+            </a:prstTxWarp>
+          </a:bodyPr>
+          <a:lstStyle>
+            <a:lvl1pPr eaLnBrk="0">
+              <a:defRPr>
+                <a:latin typeface="Calibri" pitchFamily="34" charset="0"/>
+              </a:defRPr>
+            </a:lvl1pPr>
+          </a:lstStyle>
+          <a:p>
+            <a:fld id="{FCFDADFA-EB9D-4010-884E-0ED9201A937C}" type="datetime1">
+              <a:rPr lang="en-US"/>
+              <a:pPr/>
+              <a:t>8/14/2007</a:t>
+            </a:fld>
+            <a:endParaRPr lang="en-US"/>
+          </a:p>
+        </p:txBody>
+      </p:sp>
+      <p:sp>
+        <p:nvSpPr>
+          <p:cNvPr id="1029" name="Rectangle 5"/>
+          <p:cNvSpPr>
+            <a:spLocks noGrp="1"/>
+          </p:cNvSpPr>
+          <p:nvPr>
+            <p:ph type="ftr" sz="quarter" idx="3"/>
+          </p:nvPr>
+        </p:nvSpPr>
+        <p:spPr bwMode="auto">
+          <a:xfrm>
+            <a:off x="3124200" y="6245225"/>
+            <a:ext cx="2895600" cy="476250"/>
+          </a:xfrm>
+          <a:prstGeom prst="rect">
+            <a:avLst/>
+          </a:prstGeom>
+          <a:noFill/>
+          <a:ln w="9525">
+            <a:noFill/>
+            <a:miter lim="800000"/>
+            <a:headEnd/>
+            <a:tailEnd/>
+          </a:ln>
+        </p:spPr>
+        <p:txBody>
+          <a:bodyPr vert="horz" wrap="square" lIns="91440" tIns="45720" rIns="91440" bIns="45720" numCol="1" anchor="t" anchorCtr="0" compatLnSpc="1">
+            <a:prstTxWarp prst="textNoShape">
+              <a:avLst/>
+            </a:prstTxWarp>
+          </a:bodyPr>
+          <a:lstStyle>
+            <a:lvl1pPr eaLnBrk="0">
+              <a:defRPr>
+                <a:latin typeface="Calibri" pitchFamily="34" charset="0"/>
+              </a:defRPr>
+            </a:lvl1pPr>
+          </a:lstStyle>
+          <a:p>
+            <a:endParaRPr lang="en-US"/>
+          </a:p>
+        </p:txBody>
+      </p:sp>
+      <p:sp>
+        <p:nvSpPr>
+          <p:cNvPr id="1030" name="Rectangle 6"/>
+          <p:cNvSpPr>
+            <a:spLocks noGrp="1"/>
+          </p:cNvSpPr>
+          <p:nvPr>
+            <p:ph type="sldNum" sz="quarter" idx="4"/>
+          </p:nvPr>
+        </p:nvSpPr>
+        <p:spPr bwMode="auto">
+          <a:xfrm>
+            <a:off x="6553200" y="6245225"/>
+            <a:ext cx="2133600" cy="476250"/>
+          </a:xfrm>
+          <a:prstGeom prst="rect">
+            <a:avLst/>
+          </a:prstGeom>
+          <a:noFill/>
+          <a:ln w="9525">
+            <a:noFill/>
+            <a:miter lim="800000"/>
+            <a:headEnd/>
+            <a:tailEnd/>
+          </a:ln>
+        </p:spPr>
+        <p:txBody>
+          <a:bodyPr vert="horz" wrap="square" lIns="91440" tIns="45720" rIns="91440" bIns="45720" numCol="1" anchor="t" anchorCtr="0" compatLnSpc="1">
+            <a:prstTxWarp prst="textNoShape">
+              <a:avLst/>
+            </a:prstTxWarp>
+          </a:bodyPr>
+          <a:lstStyle>
+            <a:lvl1pPr eaLnBrk="0">
+              <a:defRPr>
+                <a:latin typeface="Calibri" pitchFamily="34" charset="0"/>
+              </a:defRPr>
+            </a:lvl1pPr>
+          </a:lstStyle>
+          <a:p>
+            <a:fld id="{6074AD92-7231-4B06-8A02-4F89A5B96111}" type="slidenum">
+              <a:rPr lang="en-US"/>
+              <a:pPr/>
+              <a:t>‹#›</a:t>
+            </a:fld>
+            <a:endParaRPr lang="en-US"/>
+          </a:p>
+        </p:txBody>
+      </p:sp>
+    </p:spTree>
+  </p:cSld>
+  <p:clrMap bg1="lt1" tx1="dk1" bg2="lt2" tx2="dk2" accent1="accent1" accent2="accent2" accent3="accent3" accent4="accent4" accent5="accent5" accent6="accent6" hlink="hlink" folHlink="folHlink"/>
+  <p:sldLayoutIdLst>
+    <p:sldLayoutId id="2147483649" r:id="rId1"/>
+    <p:sldLayoutId id="2147483650" r:id="rId2"/>
+    <p:sldLayoutId id="2147483651" r:id="rId3"/>
+    <p:sldLayoutId id="2147483652" r:id="rId4"/>
+    <p:sldLayoutId id="2147483653" r:id="rId5"/>
+    <p:sldLayoutId id="2147483654" r:id="rId6"/>
+    <p:sldLayoutId id="2147483655" r:id="rId7"/>
+  </p:sldLayoutIdLst>
+  <p:txStyles>
+    <p:titleStyle>
+      <a:lvl1pPr algn="ctr" rtl="0" eaLnBrk="0" fontAlgn="base" hangingPunct="0">
+        <a:spcBef>
+          <a:spcPct val="0"/>
+        </a:spcBef>
+        <a:spcAft>
+          <a:spcPct val="0"/>
+        </a:spcAft>
+        <a:defRPr sz="4400">
+          <a:solidFill>
+            <a:schemeClr val="tx1"/>
+          </a:solidFill>
+          <a:latin typeface="Calibri" pitchFamily="34" charset="0"/>
+        </a:defRPr>
+      </a:lvl1pPr>
+      <a:lvl2pPr algn="ctr" rtl="0" eaLnBrk="0" fontAlgn="base" hangingPunct="0">
+        <a:spcBef>
+          <a:spcPct val="0"/>
+        </a:spcBef>
+        <a:spcAft>
+          <a:spcPct val="0"/>
+        </a:spcAft>
+        <a:defRPr sz="4400">
+          <a:solidFill>
+            <a:schemeClr val="tx1"/>
+          </a:solidFill>
+          <a:latin typeface="Calibri" pitchFamily="34" charset="0"/>
+        </a:defRPr>
+      </a:lvl2pPr>
+      <a:lvl3pPr algn="ctr" rtl="0" eaLnBrk="0" fontAlgn="base" hangingPunct="0">
+        <a:spcBef>
+          <a:spcPct val="0"/>
+        </a:spcBef>
+        <a:spcAft>
+          <a:spcPct val="0"/>
+        </a:spcAft>
+        <a:defRPr sz="4400">
+          <a:solidFill>
+            <a:schemeClr val="tx1"/>
+          </a:solidFill>
+          <a:latin typeface="Calibri" pitchFamily="34" charset="0"/>
+        </a:defRPr>
+      </a:lvl3pPr>
+      <a:lvl4pPr algn="ctr" rtl="0" eaLnBrk="0" fontAlgn="base" hangingPunct="0">
+        <a:spcBef>
+          <a:spcPct val="0"/>
+        </a:spcBef>
+        <a:spcAft>
+          <a:spcPct val="0"/>
+        </a:spcAft>
+        <a:defRPr sz="4400">
+          <a:solidFill>
+            <a:schemeClr val="tx1"/>
+          </a:solidFill>
+          <a:latin typeface="Calibri" pitchFamily="34" charset="0"/>
+        </a:defRPr>
+      </a:lvl4pPr>
+      <a:lvl5pPr algn="ctr" rtl="0" eaLnBrk="0" fontAlgn="base" hangingPunct="0">
+        <a:spcBef>
+          <a:spcPct val="0"/>
+        </a:spcBef>
+        <a:spcAft>
+          <a:spcPct val="0"/>
+        </a:spcAft>
+        <a:defRPr sz="4400">
+          <a:solidFill>
+            <a:schemeClr val="tx1"/>
+          </a:solidFill>
+          <a:latin typeface="Calibri" pitchFamily="34" charset="0"/>
+        </a:defRPr>
+      </a:lvl5pPr>
+      <a:lvl6pPr marL="457200" algn="ctr" rtl="0" eaLnBrk="0" fontAlgn="base" hangingPunct="0">
+        <a:spcBef>
+          <a:spcPct val="0"/>
+        </a:spcBef>
+        <a:spcAft>
+          <a:spcPct val="0"/>
+        </a:spcAft>
+        <a:defRPr sz="4400">
+          <a:solidFill>
+            <a:schemeClr val="tx1"/>
+          </a:solidFill>
+          <a:latin typeface="Calibri" pitchFamily="34" charset="0"/>
+        </a:defRPr>
+      </a:lvl6pPr>
+      <a:lvl7pPr marL="914400" algn="ctr" rtl="0" eaLnBrk="0" fontAlgn="base" hangingPunct="0">
+        <a:spcBef>
+          <a:spcPct val="0"/>
+        </a:spcBef>
+        <a:spcAft>
+          <a:spcPct val="0"/>
+        </a:spcAft>
+        <a:defRPr sz="4400">
+          <a:solidFill>
+            <a:schemeClr val="tx1"/>
+          </a:solidFill>
+          <a:latin typeface="Calibri" pitchFamily="34" charset="0"/>
+        </a:defRPr>
+      </a:lvl7pPr>
+      <a:lvl8pPr marL="1371600" algn="ctr" rtl="0" eaLnBrk="0" fontAlgn="base" hangingPunct="0">
+        <a:spcBef>
+          <a:spcPct val="0"/>
+        </a:spcBef>
+        <a:spcAft>
+          <a:spcPct val="0"/>
+        </a:spcAft>
+        <a:defRPr sz="4400">
+          <a:solidFill>
+            <a:schemeClr val="tx1"/>
+          </a:solidFill>
+          <a:latin typeface="Calibri" pitchFamily="34" charset="0"/>
+        </a:defRPr>
+      </a:lvl8pPr>
+      <a:lvl9pPr marL="1828800" algn="ctr" rtl="0" eaLnBrk="0" fontAlgn="base" hangingPunct="0">
+        <a:spcBef>
+          <a:spcPct val="0"/>
+        </a:spcBef>
+        <a:spcAft>
+          <a:spcPct val="0"/>
+        </a:spcAft>
+        <a:defRPr sz="4400">
+          <a:solidFill>
+            <a:schemeClr val="tx1"/>
+          </a:solidFill>
+          <a:latin typeface="Calibri" pitchFamily="34" charset="0"/>
+        </a:defRPr>
+      </a:lvl9pPr>
+    </p:titleStyle>
+    <p:bodyStyle>
+      <a:lvl1pPr marL="342900" indent="-342900" algn="l" rtl="0" eaLnBrk="0" fontAlgn="base" hangingPunct="0">
+        <a:spcBef>
+          <a:spcPct val="20000"/>
+        </a:spcBef>
+        <a:spcAft>
+          <a:spcPct val="0"/>
+        </a:spcAft>
+        <a:buChar char="•"/>
+        <a:defRPr sz="3200">
+          <a:solidFill>
+            <a:schemeClr val="tx1"/>
+          </a:solidFill>
+          <a:latin typeface="Calibri" pitchFamily="34" charset="0"/>
+        </a:defRPr>
+      </a:lvl1pPr>
+      <a:lvl2pPr marL="742950" indent="-285750" algn="l" rtl="0" eaLnBrk="0" fontAlgn="base" hangingPunct="0">
+        <a:spcBef>
+          <a:spcPct val="20000"/>
+        </a:spcBef>
+        <a:spcAft>
+          <a:spcPct val="0"/>
+        </a:spcAft>
+        <a:buChar char="–"/>
+        <a:defRPr sz="2800">
+          <a:solidFill>
+            <a:schemeClr val="tx1"/>
+          </a:solidFill>
+          <a:latin typeface="Calibri" pitchFamily="34" charset="0"/>
+        </a:defRPr>
+      </a:lvl2pPr>
+      <a:lvl3pPr marL="1143000" indent="-228600" algn="l" rtl="0" eaLnBrk="0" fontAlgn="base" hangingPunct="0">
+        <a:spcBef>
+          <a:spcPct val="20000"/>
+        </a:spcBef>
+        <a:spcAft>
+          <a:spcPct val="0"/>
+        </a:spcAft>
+        <a:buChar char="•"/>
+        <a:defRPr sz="2400">
+          <a:solidFill>
+            <a:schemeClr val="tx1"/>
+          </a:solidFill>
+          <a:latin typeface="Calibri" pitchFamily="34" charset="0"/>
+        </a:defRPr>
+      </a:lvl3pPr>
+      <a:lvl4pPr marL="1600200" indent="-228600" algn="l" rtl="0" eaLnBrk="0" fontAlgn="base" hangingPunct="0">
+        <a:spcBef>
+          <a:spcPct val="20000"/>
+        </a:spcBef>
+        <a:spcAft>
+          <a:spcPct val="0"/>
+        </a:spcAft>
+        <a:buChar char="–"/>
+        <a:defRPr sz="2000">
+          <a:solidFill>
+            <a:schemeClr val="tx1"/>
+          </a:solidFill>
+          <a:latin typeface="Calibri" pitchFamily="34" charset="0"/>
+        </a:defRPr>
+      </a:lvl4pPr>
+      <a:lvl5pPr marL="2057400" indent="-228600" algn="l" rtl="0" eaLnBrk="0" fontAlgn="base" hangingPunct="0">
+        <a:spcBef>
+          <a:spcPct val="20000"/>
+        </a:spcBef>
+        <a:spcAft>
+          <a:spcPct val="0"/>
+        </a:spcAft>
+        <a:buChar char="»"/>
+        <a:defRPr sz="2000">
+          <a:solidFill>
+            <a:schemeClr val="tx1"/>
+          </a:solidFill>
+          <a:latin typeface="Calibri" pitchFamily="34" charset="0"/>
+        </a:defRPr>
+      </a:lvl5pPr>
+      <a:lvl6pPr marL="2514600" indent="-228600" algn="l" rtl="0" eaLnBrk="0" fontAlgn="base" hangingPunct="0">
+        <a:spcBef>
+          <a:spcPct val="20000"/>
+        </a:spcBef>
+        <a:spcAft>
+          <a:spcPct val="0"/>
+        </a:spcAft>
+        <a:buChar char="»"/>
+        <a:defRPr sz="2000">
+          <a:solidFill>
+            <a:schemeClr val="tx1"/>
+          </a:solidFill>
+          <a:latin typeface="Calibri" pitchFamily="34" charset="0"/>
+        </a:defRPr>
+      </a:lvl6pPr>
+      <a:lvl7pPr marL="2971800" indent="-228600" algn="l" rtl="0" eaLnBrk="0" fontAlgn="base" hangingPunct="0">
+        <a:spcBef>
+          <a:spcPct val="20000"/>
+        </a:spcBef>
+        <a:spcAft>
+          <a:spcPct val="0"/>
+        </a:spcAft>
+        <a:buChar char="»"/>
+        <a:defRPr sz="2000">
+          <a:solidFill>
+            <a:schemeClr val="tx1"/>
+          </a:solidFill>
+          <a:latin typeface="Calibri" pitchFamily="34" charset="0"/>
+        </a:defRPr>
+      </a:lvl7pPr>
+      <a:lvl8pPr marL="3429000" indent="-228600" algn="l" rtl="0" eaLnBrk="0" fontAlgn="base" hangingPunct="0">
+        <a:spcBef>
+          <a:spcPct val="20000"/>
+        </a:spcBef>
+        <a:spcAft>
+          <a:spcPct val="0"/>
+        </a:spcAft>
+        <a:buChar char="»"/>
+        <a:defRPr sz="2000">
+          <a:solidFill>
+            <a:schemeClr val="tx1"/>
+          </a:solidFill>
+          <a:latin typeface="Calibri" pitchFamily="34" charset="0"/>
+        </a:defRPr>
+      </a:lvl8pPr>
+      <a:lvl9pPr marL="3886200" indent="-228600" algn="l" rtl="0" eaLnBrk="0" fontAlgn="base" hangingPunct="0">
+        <a:spcBef>
+          <a:spcPct val="20000"/>
+        </a:spcBef>
+        <a:spcAft>
+          <a:spcPct val="0"/>
+        </a:spcAft>
+        <a:buChar char="»"/>
+        <a:defRPr sz="2000">
+          <a:solidFill>
+            <a:schemeClr val="tx1"/>
+          </a:solidFill>
+          <a:latin typeface="Calibri" pitchFamily="34" charset="0"/>
+        </a:defRPr>
+      </a:lvl9pPr>
+    </p:bodyStyle>
+    <p:otherStyle/>
+  </p:txStyles>
+</p:sldMaster>
+</file>
+
+<file path=ppt/slides/slide1.xml><?xml version="1.0" encoding="utf-8"?>
+<p:sld xmlns:a="http://schemas.openxmlformats.org/drawingml/2006/main" xmlns:r="http://schemas.openxmlformats.org/officeDocument/2006/relationships" xmlns:p="http://schemas.openxmlformats.org/presentationml/2006/main">
+  <p:cSld>
+    <p:spTree>
+      <p:nvGrpSpPr>
+        <p:cNvPr id="1" name=""/>
+        <p:cNvGrpSpPr/>
+        <p:nvPr/>
+      </p:nvGrpSpPr>
+      <p:grpSpPr>
+        <a:xfrm>
+          <a:off x="0" y="0"/>
+          <a:ext cx="0" cy="0"/>
+          <a:chOff x="0" y="0"/>
+          <a:chExt cx="0" cy="0"/>
+        </a:xfrm>
+      </p:grpSpPr>
+      <p:sp>
+        <p:nvSpPr>
+          <p:cNvPr id="2049" name="Rectangle 2"/>
+          <p:cNvSpPr>
+            <a:spLocks noGrp="1"/>
+          </p:cNvSpPr>
+          <p:nvPr>
+            <p:ph type="ctrTitle"/>
+          </p:nvPr>
+        </p:nvSpPr>
+        <p:spPr/>
+        <p:txBody>
+          <a:bodyPr/>
+          <a:lstStyle/>
+          <a:p>
+            <a:pPr hangingPunct="1"/>
+            <a:r>
+              <a:rPr lang="en-US">
+                <a:sym typeface="Wingdings" pitchFamily="2" charset="2"/>
+              </a:rPr>
+              <a:t>Lorem ipsum dolor sit amet</a:t>
+            </a:r>
+            <a:endParaRPr lang="en-US"/>
+          </a:p>
+        </p:txBody>
+      </p:sp>
+      <p:sp>
+        <p:nvSpPr>
+          <p:cNvPr id="2050" name="Rectangle 3"/>
+          <p:cNvSpPr>
+            <a:spLocks noGrp="1"/>
+          </p:cNvSpPr>
+          <p:nvPr>
+            <p:ph type="subTitle" idx="1"/>
+          </p:nvPr>
+        </p:nvSpPr>
+        <p:spPr/>
+        <p:txBody>
+          <a:bodyPr/>
+          <a:lstStyle/>
+          <a:p>
+            <a:pPr eaLnBrk="1" hangingPunct="1">
+              <a:spcAft>
+                <a:spcPct val="10000"/>
+              </a:spcAft>
+            </a:pPr>
+            <a:r>
+              <a:rPr lang="en-US">
+                <a:sym typeface="Wingdings" pitchFamily="2" charset="2"/>
+              </a:rPr>
+              <a:t>Nunc at risus vel erat tempus posuere. Aenean non ante.</a:t>
+            </a:r>
+            <a:endParaRPr lang="en-US"/>
+          </a:p>
+          <a:p>
+            <a:pPr hangingPunct="1"/>
+            <a:endParaRPr lang="en-US"/>
+          </a:p>
+        </p:txBody>
+      </p:sp>
+    </p:spTree>
+  </p:cSld>
+  <p:clrMapOvr>
+    <a:masterClrMapping/>
+  </p:clrMapOvr>
+</p:sld>
+</file>
+
+<file path=ppt/slides/slide2.xml><?xml version="1.0" encoding="utf-8"?>
+<p:sld xmlns:a="http://schemas.openxmlformats.org/drawingml/2006/main" xmlns:r="http://schemas.openxmlformats.org/officeDocument/2006/relationships" xmlns:p="http://schemas.openxmlformats.org/presentationml/2006/main">
+  <p:cSld>
+    <p:spTree>
+      <p:nvGrpSpPr>
+        <p:cNvPr id="1" name=""/>
+        <p:cNvGrpSpPr/>
+        <p:nvPr/>
+      </p:nvGrpSpPr>
+      <p:grpSpPr>
+        <a:xfrm>
+          <a:off x="0" y="0"/>
+          <a:ext cx="0" cy="0"/>
+          <a:chOff x="0" y="0"/>
+          <a:chExt cx="0" cy="0"/>
+        </a:xfrm>
+      </p:grpSpPr>
+      <p:sp>
+        <p:nvSpPr>
+          <p:cNvPr id="3073" name="Rectangle 2"/>
+          <p:cNvSpPr>
+            <a:spLocks noGrp="1"/>
+          </p:cNvSpPr>
+          <p:nvPr>
+            <p:ph type="title"/>
+          </p:nvPr>
+        </p:nvSpPr>
+        <p:spPr/>
+        <p:txBody>
+          <a:bodyPr/>
+          <a:lstStyle/>
+          <a:p>
+            <a:pPr hangingPunct="1"/>
+            <a:r>
+              <a:rPr lang="en-US">
+                <a:sym typeface="Wingdings" pitchFamily="2" charset="2"/>
+              </a:rPr>
+              <a:t>Lorem ipsum dolor sit amet</a:t>
+            </a:r>
+            <a:endParaRPr lang="en-US"/>
+          </a:p>
+        </p:txBody>
+      </p:sp>
+      <p:sp>
+        <p:nvSpPr>
+          <p:cNvPr id="3074" name="Rectangle 3"/>
+          <p:cNvSpPr>
+            <a:spLocks noGrp="1"/>
+          </p:cNvSpPr>
+          <p:nvPr>
+            <p:ph type="body" idx="1"/>
+          </p:nvPr>
+        </p:nvSpPr>
+        <p:spPr/>
+        <p:txBody>
+          <a:bodyPr/>
+          <a:lstStyle/>
+          <a:p>
+            <a:pPr hangingPunct="1"/>
+            <a:r>
+              <a:rPr lang="da-DK"/>
+              <a:t>Lorem</a:t>
+            </a:r>
+          </a:p>
+          <a:p>
+            <a:pPr hangingPunct="1"/>
+            <a:r>
+              <a:rPr lang="da-DK"/>
+              <a:t>ipsum</a:t>
+            </a:r>
+          </a:p>
+          <a:p>
+            <a:pPr hangingPunct="1"/>
+            <a:r>
+              <a:rPr lang="da-DK"/>
+              <a:t>dolor</a:t>
+            </a:r>
+          </a:p>
+          <a:p>
+            <a:pPr hangingPunct="1"/>
+            <a:r>
+              <a:rPr lang="da-DK"/>
+              <a:t>sit</a:t>
+            </a:r>
+          </a:p>
+          <a:p>
+            <a:pPr hangingPunct="1"/>
+            <a:r>
+              <a:rPr lang="da-DK"/>
+              <a:t>amet</a:t>
+            </a:r>
+          </a:p>
+          <a:p>
+            <a:pPr hangingPunct="1"/>
+            <a:endParaRPr lang="en-US"/>
+          </a:p>
+        </p:txBody>
+      </p:sp>
+    </p:spTree>
+  </p:cSld>
+  <p:clrMapOvr>
+    <a:masterClrMapping/>
+  </p:clrMapOvr>
+</p:sld>
 </file>
 
 <file path=ppt/theme/theme1.xml><?xml version="1.0" encoding="utf-8"?>

</xml_diff>